<commit_message>
Alaisha messing around round 2
</commit_message>
<xml_diff>
--- a/QEC Final Project.pptx
+++ b/QEC Final Project.pptx
@@ -818,7 +818,7 @@
   <p:cSld>
     <p:spTree>
       <p:nvGrpSpPr>
-        <p:cNvPr id="192" name="Shape 192"/>
+        <p:cNvPr id="193" name="Shape 193"/>
         <p:cNvGrpSpPr/>
         <p:nvPr/>
       </p:nvGrpSpPr>
@@ -832,7 +832,7 @@
       </p:grpSpPr>
       <p:sp>
         <p:nvSpPr>
-          <p:cNvPr id="193" name="Shape 193"/>
+          <p:cNvPr id="194" name="Shape 194"/>
           <p:cNvSpPr/>
           <p:nvPr>
             <p:ph idx="2" type="sldImg"/>
@@ -866,7 +866,7 @@
       </p:sp>
       <p:sp>
         <p:nvSpPr>
-          <p:cNvPr id="194" name="Shape 194"/>
+          <p:cNvPr id="195" name="Shape 195"/>
           <p:cNvSpPr txBox="1"/>
           <p:nvPr>
             <p:ph idx="1" type="body"/>
@@ -916,7 +916,7 @@
   <p:cSld>
     <p:spTree>
       <p:nvGrpSpPr>
-        <p:cNvPr id="200" name="Shape 200"/>
+        <p:cNvPr id="201" name="Shape 201"/>
         <p:cNvGrpSpPr/>
         <p:nvPr/>
       </p:nvGrpSpPr>
@@ -930,7 +930,7 @@
       </p:grpSpPr>
       <p:sp>
         <p:nvSpPr>
-          <p:cNvPr id="201" name="Shape 201"/>
+          <p:cNvPr id="202" name="Shape 202"/>
           <p:cNvSpPr/>
           <p:nvPr>
             <p:ph idx="2" type="sldImg"/>
@@ -964,7 +964,7 @@
       </p:sp>
       <p:sp>
         <p:nvSpPr>
-          <p:cNvPr id="202" name="Shape 202"/>
+          <p:cNvPr id="203" name="Shape 203"/>
           <p:cNvSpPr txBox="1"/>
           <p:nvPr>
             <p:ph idx="1" type="body"/>
@@ -1014,7 +1014,7 @@
   <p:cSld>
     <p:spTree>
       <p:nvGrpSpPr>
-        <p:cNvPr id="206" name="Shape 206"/>
+        <p:cNvPr id="207" name="Shape 207"/>
         <p:cNvGrpSpPr/>
         <p:nvPr/>
       </p:nvGrpSpPr>
@@ -1028,7 +1028,7 @@
       </p:grpSpPr>
       <p:sp>
         <p:nvSpPr>
-          <p:cNvPr id="207" name="Shape 207"/>
+          <p:cNvPr id="208" name="Shape 208"/>
           <p:cNvSpPr/>
           <p:nvPr>
             <p:ph idx="2" type="sldImg"/>
@@ -1062,7 +1062,7 @@
       </p:sp>
       <p:sp>
         <p:nvSpPr>
-          <p:cNvPr id="208" name="Shape 208"/>
+          <p:cNvPr id="209" name="Shape 209"/>
           <p:cNvSpPr txBox="1"/>
           <p:nvPr>
             <p:ph idx="1" type="body"/>
@@ -1112,7 +1112,7 @@
   <p:cSld>
     <p:spTree>
       <p:nvGrpSpPr>
-        <p:cNvPr id="212" name="Shape 212"/>
+        <p:cNvPr id="213" name="Shape 213"/>
         <p:cNvGrpSpPr/>
         <p:nvPr/>
       </p:nvGrpSpPr>
@@ -1126,7 +1126,7 @@
       </p:grpSpPr>
       <p:sp>
         <p:nvSpPr>
-          <p:cNvPr id="213" name="Shape 213"/>
+          <p:cNvPr id="214" name="Shape 214"/>
           <p:cNvSpPr/>
           <p:nvPr>
             <p:ph idx="2" type="sldImg"/>
@@ -1160,7 +1160,7 @@
       </p:sp>
       <p:sp>
         <p:nvSpPr>
-          <p:cNvPr id="214" name="Shape 214"/>
+          <p:cNvPr id="215" name="Shape 215"/>
           <p:cNvSpPr txBox="1"/>
           <p:nvPr>
             <p:ph idx="1" type="body"/>
@@ -1210,7 +1210,7 @@
   <p:cSld>
     <p:spTree>
       <p:nvGrpSpPr>
-        <p:cNvPr id="222" name="Shape 222"/>
+        <p:cNvPr id="223" name="Shape 223"/>
         <p:cNvGrpSpPr/>
         <p:nvPr/>
       </p:nvGrpSpPr>
@@ -1224,7 +1224,7 @@
       </p:grpSpPr>
       <p:sp>
         <p:nvSpPr>
-          <p:cNvPr id="223" name="Shape 223"/>
+          <p:cNvPr id="224" name="Shape 224"/>
           <p:cNvSpPr/>
           <p:nvPr>
             <p:ph idx="2" type="sldImg"/>
@@ -1258,7 +1258,7 @@
       </p:sp>
       <p:sp>
         <p:nvSpPr>
-          <p:cNvPr id="224" name="Shape 224"/>
+          <p:cNvPr id="225" name="Shape 225"/>
           <p:cNvSpPr txBox="1"/>
           <p:nvPr>
             <p:ph idx="1" type="body"/>
@@ -1308,7 +1308,7 @@
   <p:cSld>
     <p:spTree>
       <p:nvGrpSpPr>
-        <p:cNvPr id="228" name="Shape 228"/>
+        <p:cNvPr id="229" name="Shape 229"/>
         <p:cNvGrpSpPr/>
         <p:nvPr/>
       </p:nvGrpSpPr>
@@ -1322,7 +1322,7 @@
       </p:grpSpPr>
       <p:sp>
         <p:nvSpPr>
-          <p:cNvPr id="229" name="Shape 229"/>
+          <p:cNvPr id="230" name="Shape 230"/>
           <p:cNvSpPr/>
           <p:nvPr>
             <p:ph idx="2" type="sldImg"/>
@@ -1356,7 +1356,7 @@
       </p:sp>
       <p:sp>
         <p:nvSpPr>
-          <p:cNvPr id="230" name="Shape 230"/>
+          <p:cNvPr id="231" name="Shape 231"/>
           <p:cNvSpPr txBox="1"/>
           <p:nvPr>
             <p:ph idx="1" type="body"/>
@@ -1406,7 +1406,7 @@
   <p:cSld>
     <p:spTree>
       <p:nvGrpSpPr>
-        <p:cNvPr id="234" name="Shape 234"/>
+        <p:cNvPr id="235" name="Shape 235"/>
         <p:cNvGrpSpPr/>
         <p:nvPr/>
       </p:nvGrpSpPr>
@@ -1420,7 +1420,7 @@
       </p:grpSpPr>
       <p:sp>
         <p:nvSpPr>
-          <p:cNvPr id="235" name="Shape 235"/>
+          <p:cNvPr id="236" name="Shape 236"/>
           <p:cNvSpPr/>
           <p:nvPr>
             <p:ph idx="2" type="sldImg"/>
@@ -1454,7 +1454,7 @@
       </p:sp>
       <p:sp>
         <p:nvSpPr>
-          <p:cNvPr id="236" name="Shape 236"/>
+          <p:cNvPr id="237" name="Shape 237"/>
           <p:cNvSpPr txBox="1"/>
           <p:nvPr>
             <p:ph idx="1" type="body"/>
@@ -1504,7 +1504,7 @@
   <p:cSld>
     <p:spTree>
       <p:nvGrpSpPr>
-        <p:cNvPr id="241" name="Shape 241"/>
+        <p:cNvPr id="242" name="Shape 242"/>
         <p:cNvGrpSpPr/>
         <p:nvPr/>
       </p:nvGrpSpPr>
@@ -1518,7 +1518,7 @@
       </p:grpSpPr>
       <p:sp>
         <p:nvSpPr>
-          <p:cNvPr id="242" name="Shape 242"/>
+          <p:cNvPr id="243" name="Shape 243"/>
           <p:cNvSpPr/>
           <p:nvPr>
             <p:ph idx="2" type="sldImg"/>
@@ -1552,7 +1552,7 @@
       </p:sp>
       <p:sp>
         <p:nvSpPr>
-          <p:cNvPr id="243" name="Shape 243"/>
+          <p:cNvPr id="244" name="Shape 244"/>
           <p:cNvSpPr txBox="1"/>
           <p:nvPr>
             <p:ph idx="1" type="body"/>
@@ -1671,9 +1671,333 @@
           </a:bodyPr>
           <a:lstStyle/>
           <a:p>
+            <a:pPr indent="-317500" lvl="0" marL="457200" rtl="0">
+              <a:lnSpc>
+                <a:spcPct val="115000"/>
+              </a:lnSpc>
+              <a:spcBef>
+                <a:spcPts val="0"/>
+              </a:spcBef>
+              <a:spcAft>
+                <a:spcPts val="0"/>
+              </a:spcAft>
+              <a:buClr>
+                <a:srgbClr val="000000"/>
+              </a:buClr>
+              <a:buSzPts val="1400"/>
+              <a:buFont typeface="Lato"/>
+              <a:buChar char="●"/>
+            </a:pPr>
+            <a:r>
+              <a:rPr lang="en" sz="1400">
+                <a:latin typeface="Lato"/>
+                <a:ea typeface="Lato"/>
+                <a:cs typeface="Lato"/>
+                <a:sym typeface="Lato"/>
+              </a:rPr>
+              <a:t>General idea</a:t>
+            </a:r>
+            <a:endParaRPr sz="1400">
+              <a:latin typeface="Lato"/>
+              <a:ea typeface="Lato"/>
+              <a:cs typeface="Lato"/>
+              <a:sym typeface="Lato"/>
+            </a:endParaRPr>
+          </a:p>
+          <a:p>
+            <a:pPr indent="-317500" lvl="1" marL="914400" rtl="0">
+              <a:lnSpc>
+                <a:spcPct val="115000"/>
+              </a:lnSpc>
+              <a:spcBef>
+                <a:spcPts val="0"/>
+              </a:spcBef>
+              <a:spcAft>
+                <a:spcPts val="0"/>
+              </a:spcAft>
+              <a:buClr>
+                <a:srgbClr val="000000"/>
+              </a:buClr>
+              <a:buSzPts val="1400"/>
+              <a:buFont typeface="Lato"/>
+              <a:buChar char="○"/>
+            </a:pPr>
+            <a:r>
+              <a:rPr lang="en" sz="1400">
+                <a:latin typeface="Lato"/>
+                <a:ea typeface="Lato"/>
+                <a:cs typeface="Lato"/>
+                <a:sym typeface="Lato"/>
+              </a:rPr>
+              <a:t>Message = bit sequence</a:t>
+            </a:r>
+            <a:endParaRPr sz="1400">
+              <a:latin typeface="Lato"/>
+              <a:ea typeface="Lato"/>
+              <a:cs typeface="Lato"/>
+              <a:sym typeface="Lato"/>
+            </a:endParaRPr>
+          </a:p>
+          <a:p>
+            <a:pPr indent="-317500" lvl="1" marL="914400" rtl="0">
+              <a:lnSpc>
+                <a:spcPct val="115000"/>
+              </a:lnSpc>
+              <a:spcBef>
+                <a:spcPts val="0"/>
+              </a:spcBef>
+              <a:spcAft>
+                <a:spcPts val="0"/>
+              </a:spcAft>
+              <a:buClr>
+                <a:srgbClr val="000000"/>
+              </a:buClr>
+              <a:buSzPts val="1400"/>
+              <a:buFont typeface="Lato"/>
+              <a:buChar char="○"/>
+            </a:pPr>
+            <a:r>
+              <a:rPr lang="en" sz="1400">
+                <a:latin typeface="Lato"/>
+                <a:ea typeface="Lato"/>
+                <a:cs typeface="Lato"/>
+                <a:sym typeface="Lato"/>
+              </a:rPr>
+              <a:t>Encode a message with some redundancy</a:t>
+            </a:r>
+            <a:endParaRPr sz="1400">
+              <a:latin typeface="Lato"/>
+              <a:ea typeface="Lato"/>
+              <a:cs typeface="Lato"/>
+              <a:sym typeface="Lato"/>
+            </a:endParaRPr>
+          </a:p>
+          <a:p>
+            <a:pPr indent="-317500" lvl="1" marL="914400" rtl="0">
+              <a:lnSpc>
+                <a:spcPct val="115000"/>
+              </a:lnSpc>
+              <a:spcBef>
+                <a:spcPts val="0"/>
+              </a:spcBef>
+              <a:spcAft>
+                <a:spcPts val="0"/>
+              </a:spcAft>
+              <a:buClr>
+                <a:srgbClr val="000000"/>
+              </a:buClr>
+              <a:buSzPts val="1400"/>
+              <a:buFont typeface="Lato"/>
+              <a:buChar char="○"/>
+            </a:pPr>
+            <a:r>
+              <a:rPr lang="en" sz="1400">
+                <a:latin typeface="Lato"/>
+                <a:ea typeface="Lato"/>
+                <a:cs typeface="Lato"/>
+                <a:sym typeface="Lato"/>
+              </a:rPr>
+              <a:t>Some of the message may be corrupted</a:t>
+            </a:r>
+            <a:endParaRPr sz="1400">
+              <a:latin typeface="Lato"/>
+              <a:ea typeface="Lato"/>
+              <a:cs typeface="Lato"/>
+              <a:sym typeface="Lato"/>
+            </a:endParaRPr>
+          </a:p>
+          <a:p>
+            <a:pPr indent="-317500" lvl="1" marL="914400" rtl="0">
+              <a:lnSpc>
+                <a:spcPct val="115000"/>
+              </a:lnSpc>
+              <a:spcBef>
+                <a:spcPts val="0"/>
+              </a:spcBef>
+              <a:spcAft>
+                <a:spcPts val="0"/>
+              </a:spcAft>
+              <a:buClr>
+                <a:srgbClr val="000000"/>
+              </a:buClr>
+              <a:buSzPts val="1400"/>
+              <a:buFont typeface="Lato"/>
+              <a:buChar char="○"/>
+            </a:pPr>
+            <a:r>
+              <a:rPr lang="en" sz="1400">
+                <a:latin typeface="Lato"/>
+                <a:ea typeface="Lato"/>
+                <a:cs typeface="Lato"/>
+                <a:sym typeface="Lato"/>
+              </a:rPr>
+              <a:t>Enough redundancy that original message is recoverable</a:t>
+            </a:r>
+            <a:endParaRPr sz="1400">
+              <a:latin typeface="Lato"/>
+              <a:ea typeface="Lato"/>
+              <a:cs typeface="Lato"/>
+              <a:sym typeface="Lato"/>
+            </a:endParaRPr>
+          </a:p>
+          <a:p>
+            <a:pPr indent="-317500" lvl="0" marL="457200" rtl="0">
+              <a:lnSpc>
+                <a:spcPct val="115000"/>
+              </a:lnSpc>
+              <a:spcBef>
+                <a:spcPts val="0"/>
+              </a:spcBef>
+              <a:spcAft>
+                <a:spcPts val="0"/>
+              </a:spcAft>
+              <a:buClr>
+                <a:srgbClr val="000000"/>
+              </a:buClr>
+              <a:buSzPts val="1400"/>
+              <a:buFont typeface="Lato"/>
+              <a:buChar char="●"/>
+            </a:pPr>
+            <a:r>
+              <a:rPr lang="en" sz="1400">
+                <a:latin typeface="Lato"/>
+                <a:ea typeface="Lato"/>
+                <a:cs typeface="Lato"/>
+                <a:sym typeface="Lato"/>
+              </a:rPr>
+              <a:t>Binary symmetric channel</a:t>
+            </a:r>
+            <a:endParaRPr sz="1400">
+              <a:latin typeface="Lato"/>
+              <a:ea typeface="Lato"/>
+              <a:cs typeface="Lato"/>
+              <a:sym typeface="Lato"/>
+            </a:endParaRPr>
+          </a:p>
+          <a:p>
+            <a:pPr indent="-317500" lvl="1" marL="914400" rtl="0">
+              <a:lnSpc>
+                <a:spcPct val="115000"/>
+              </a:lnSpc>
+              <a:spcBef>
+                <a:spcPts val="0"/>
+              </a:spcBef>
+              <a:spcAft>
+                <a:spcPts val="0"/>
+              </a:spcAft>
+              <a:buClr>
+                <a:srgbClr val="000000"/>
+              </a:buClr>
+              <a:buSzPts val="1400"/>
+              <a:buFont typeface="Lato"/>
+              <a:buChar char="○"/>
+            </a:pPr>
+            <a:r>
+              <a:rPr lang="en" sz="1400">
+                <a:latin typeface="Lato"/>
+                <a:ea typeface="Lato"/>
+                <a:cs typeface="Lato"/>
+                <a:sym typeface="Lato"/>
+              </a:rPr>
+              <a:t>0 → 000</a:t>
+            </a:r>
+            <a:endParaRPr sz="1400">
+              <a:latin typeface="Lato"/>
+              <a:ea typeface="Lato"/>
+              <a:cs typeface="Lato"/>
+              <a:sym typeface="Lato"/>
+            </a:endParaRPr>
+          </a:p>
+          <a:p>
+            <a:pPr indent="-317500" lvl="1" marL="914400" rtl="0">
+              <a:lnSpc>
+                <a:spcPct val="115000"/>
+              </a:lnSpc>
+              <a:spcBef>
+                <a:spcPts val="0"/>
+              </a:spcBef>
+              <a:spcAft>
+                <a:spcPts val="0"/>
+              </a:spcAft>
+              <a:buClr>
+                <a:srgbClr val="000000"/>
+              </a:buClr>
+              <a:buSzPts val="1400"/>
+              <a:buFont typeface="Lato"/>
+              <a:buChar char="○"/>
+            </a:pPr>
+            <a:r>
+              <a:rPr lang="en" sz="1400">
+                <a:latin typeface="Lato"/>
+                <a:ea typeface="Lato"/>
+                <a:cs typeface="Lato"/>
+                <a:sym typeface="Lato"/>
+              </a:rPr>
+              <a:t>1 → 111</a:t>
+            </a:r>
+            <a:endParaRPr sz="1400">
+              <a:latin typeface="Lato"/>
+              <a:ea typeface="Lato"/>
+              <a:cs typeface="Lato"/>
+              <a:sym typeface="Lato"/>
+            </a:endParaRPr>
+          </a:p>
+          <a:p>
+            <a:pPr indent="-317500" lvl="1" marL="914400" rtl="0">
+              <a:lnSpc>
+                <a:spcPct val="115000"/>
+              </a:lnSpc>
+              <a:spcBef>
+                <a:spcPts val="0"/>
+              </a:spcBef>
+              <a:spcAft>
+                <a:spcPts val="0"/>
+              </a:spcAft>
+              <a:buClr>
+                <a:srgbClr val="000000"/>
+              </a:buClr>
+              <a:buSzPts val="1400"/>
+              <a:buFont typeface="Lato"/>
+              <a:buChar char="○"/>
+            </a:pPr>
+            <a:r>
+              <a:rPr lang="en" sz="1400">
+                <a:latin typeface="Lato"/>
+                <a:ea typeface="Lato"/>
+                <a:cs typeface="Lato"/>
+                <a:sym typeface="Lato"/>
+              </a:rPr>
+              <a:t>Small error probability </a:t>
+            </a:r>
+            <a:r>
+              <a:rPr i="1" lang="en" sz="1400">
+                <a:latin typeface="Lato"/>
+                <a:ea typeface="Lato"/>
+                <a:cs typeface="Lato"/>
+                <a:sym typeface="Lato"/>
+              </a:rPr>
+              <a:t>p</a:t>
+            </a:r>
+            <a:r>
+              <a:rPr lang="en" sz="1400">
+                <a:latin typeface="Lato"/>
+                <a:ea typeface="Lato"/>
+                <a:cs typeface="Lato"/>
+                <a:sym typeface="Lato"/>
+              </a:rPr>
+              <a:t> means that only one bit likely to be flipped</a:t>
+            </a:r>
+            <a:endParaRPr sz="1400">
+              <a:latin typeface="Lato"/>
+              <a:ea typeface="Lato"/>
+              <a:cs typeface="Lato"/>
+              <a:sym typeface="Lato"/>
+            </a:endParaRPr>
+          </a:p>
+          <a:p>
             <a:pPr indent="0" lvl="0" marL="0">
               <a:spcBef>
-                <a:spcPts val="0"/>
+                <a:spcPts val="1600"/>
               </a:spcBef>
               <a:spcAft>
                 <a:spcPts val="0"/>
@@ -1769,7 +2093,7 @@
           </a:bodyPr>
           <a:lstStyle/>
           <a:p>
-            <a:pPr indent="-317500" lvl="0" marL="457200" rtl="0">
+            <a:pPr indent="-298450" lvl="0" marL="457200" rtl="0">
               <a:lnSpc>
                 <a:spcPct val="115000"/>
               </a:lnSpc>
@@ -1782,12 +2106,12 @@
               <a:buClr>
                 <a:srgbClr val="000000"/>
               </a:buClr>
-              <a:buSzPts val="1400"/>
+              <a:buSzPts val="1100"/>
               <a:buFont typeface="Lato"/>
               <a:buChar char="●"/>
             </a:pPr>
             <a:r>
-              <a:rPr b="1" lang="en" sz="1400">
+              <a:rPr b="1" lang="en">
                 <a:latin typeface="Lato"/>
                 <a:ea typeface="Lato"/>
                 <a:cs typeface="Lato"/>
@@ -1795,7 +2119,7 @@
               </a:rPr>
               <a:t>No cloning states</a:t>
             </a:r>
-            <a:endParaRPr b="1" sz="1400">
+            <a:endParaRPr b="1">
               <a:latin typeface="Lato"/>
               <a:ea typeface="Lato"/>
               <a:cs typeface="Lato"/>
@@ -1803,7 +2127,7 @@
             </a:endParaRPr>
           </a:p>
           <a:p>
-            <a:pPr indent="-317500" lvl="1" marL="914400" rtl="0">
+            <a:pPr indent="-298450" lvl="1" marL="914400" rtl="0">
               <a:lnSpc>
                 <a:spcPct val="115000"/>
               </a:lnSpc>
@@ -1816,12 +2140,12 @@
               <a:buClr>
                 <a:srgbClr val="000000"/>
               </a:buClr>
-              <a:buSzPts val="1400"/>
+              <a:buSzPts val="1100"/>
               <a:buFont typeface="Lato"/>
               <a:buChar char="○"/>
             </a:pPr>
             <a:r>
-              <a:rPr lang="en" sz="1400">
+              <a:rPr lang="en">
                 <a:latin typeface="Lato"/>
                 <a:ea typeface="Lato"/>
                 <a:cs typeface="Lato"/>
@@ -1829,7 +2153,7 @@
               </a:rPr>
               <a:t>Repetition codes work for classical bits</a:t>
             </a:r>
-            <a:endParaRPr sz="1400">
+            <a:endParaRPr>
               <a:latin typeface="Lato"/>
               <a:ea typeface="Lato"/>
               <a:cs typeface="Lato"/>
@@ -1837,7 +2161,7 @@
             </a:endParaRPr>
           </a:p>
           <a:p>
-            <a:pPr indent="-317500" lvl="1" marL="914400" rtl="0">
+            <a:pPr indent="-298450" lvl="1" marL="914400" rtl="0">
               <a:lnSpc>
                 <a:spcPct val="115000"/>
               </a:lnSpc>
@@ -1850,12 +2174,12 @@
               <a:buClr>
                 <a:srgbClr val="000000"/>
               </a:buClr>
-              <a:buSzPts val="1400"/>
+              <a:buSzPts val="1100"/>
               <a:buFont typeface="Lato"/>
               <a:buChar char="○"/>
             </a:pPr>
             <a:r>
-              <a:rPr lang="en" sz="1400">
+              <a:rPr lang="en">
                 <a:latin typeface="Lato"/>
                 <a:ea typeface="Lato"/>
                 <a:cs typeface="Lato"/>
@@ -1863,7 +2187,7 @@
               </a:rPr>
               <a:t>Qubits cannot be replicated (would require looking at superposition)</a:t>
             </a:r>
-            <a:endParaRPr sz="1400">
+            <a:endParaRPr>
               <a:latin typeface="Lato"/>
               <a:ea typeface="Lato"/>
               <a:cs typeface="Lato"/>
@@ -1871,7 +2195,7 @@
             </a:endParaRPr>
           </a:p>
           <a:p>
-            <a:pPr indent="-317500" lvl="0" marL="457200" rtl="0">
+            <a:pPr indent="-298450" lvl="0" marL="457200" rtl="0">
               <a:lnSpc>
                 <a:spcPct val="115000"/>
               </a:lnSpc>
@@ -1884,12 +2208,12 @@
               <a:buClr>
                 <a:srgbClr val="000000"/>
               </a:buClr>
-              <a:buSzPts val="1400"/>
+              <a:buSzPts val="1100"/>
               <a:buFont typeface="Lato"/>
               <a:buChar char="●"/>
             </a:pPr>
             <a:r>
-              <a:rPr b="1" lang="en" sz="1400">
+              <a:rPr b="1" lang="en">
                 <a:latin typeface="Lato"/>
                 <a:ea typeface="Lato"/>
                 <a:cs typeface="Lato"/>
@@ -1897,7 +2221,7 @@
               </a:rPr>
               <a:t>Errors are continuous	</a:t>
             </a:r>
-            <a:endParaRPr b="1" sz="1400">
+            <a:endParaRPr b="1">
               <a:latin typeface="Lato"/>
               <a:ea typeface="Lato"/>
               <a:cs typeface="Lato"/>
@@ -1905,7 +2229,7 @@
             </a:endParaRPr>
           </a:p>
           <a:p>
-            <a:pPr indent="-317500" lvl="1" marL="914400" rtl="0">
+            <a:pPr indent="-298450" lvl="1" marL="914400" rtl="0">
               <a:lnSpc>
                 <a:spcPct val="115000"/>
               </a:lnSpc>
@@ -1918,12 +2242,12 @@
               <a:buClr>
                 <a:srgbClr val="000000"/>
               </a:buClr>
-              <a:buSzPts val="1400"/>
+              <a:buSzPts val="1100"/>
               <a:buFont typeface="Lato"/>
               <a:buChar char="○"/>
             </a:pPr>
             <a:r>
-              <a:rPr lang="en" sz="1400">
+              <a:rPr lang="en">
                 <a:latin typeface="Lato"/>
                 <a:ea typeface="Lato"/>
                 <a:cs typeface="Lato"/>
@@ -1931,7 +2255,7 @@
               </a:rPr>
               <a:t>Only bit flips can occur on classical bits</a:t>
             </a:r>
-            <a:endParaRPr sz="1400">
+            <a:endParaRPr>
               <a:latin typeface="Lato"/>
               <a:ea typeface="Lato"/>
               <a:cs typeface="Lato"/>
@@ -1939,7 +2263,7 @@
             </a:endParaRPr>
           </a:p>
           <a:p>
-            <a:pPr indent="-317500" lvl="1" marL="914400" rtl="0">
+            <a:pPr indent="-298450" lvl="1" marL="914400" rtl="0">
               <a:lnSpc>
                 <a:spcPct val="115000"/>
               </a:lnSpc>
@@ -1952,12 +2276,12 @@
               <a:buClr>
                 <a:srgbClr val="000000"/>
               </a:buClr>
-              <a:buSzPts val="1400"/>
+              <a:buSzPts val="1100"/>
               <a:buFont typeface="Lato"/>
               <a:buChar char="○"/>
             </a:pPr>
             <a:r>
-              <a:rPr lang="en" sz="1400">
+              <a:rPr lang="en">
                 <a:latin typeface="Lato"/>
                 <a:ea typeface="Lato"/>
                 <a:cs typeface="Lato"/>
@@ -1965,7 +2289,7 @@
               </a:rPr>
               <a:t>Continuum of different errors can occur on qubits (for example, rotating state by any amount)</a:t>
             </a:r>
-            <a:endParaRPr sz="1400">
+            <a:endParaRPr>
               <a:latin typeface="Lato"/>
               <a:ea typeface="Lato"/>
               <a:cs typeface="Lato"/>
@@ -1973,7 +2297,7 @@
             </a:endParaRPr>
           </a:p>
           <a:p>
-            <a:pPr indent="-317500" lvl="1" marL="914400" rtl="0">
+            <a:pPr indent="-298450" lvl="1" marL="914400" rtl="0">
               <a:lnSpc>
                 <a:spcPct val="115000"/>
               </a:lnSpc>
@@ -1986,12 +2310,12 @@
               <a:buClr>
                 <a:srgbClr val="000000"/>
               </a:buClr>
-              <a:buSzPts val="1400"/>
+              <a:buSzPts val="1100"/>
               <a:buFont typeface="Lato"/>
               <a:buChar char="○"/>
             </a:pPr>
             <a:r>
-              <a:rPr lang="en" sz="1400">
+              <a:rPr lang="en">
                 <a:latin typeface="Lato"/>
                 <a:ea typeface="Lato"/>
                 <a:cs typeface="Lato"/>
@@ -1999,7 +2323,7 @@
               </a:rPr>
               <a:t>Cannot determine exactly what error occurred (would require infinite resources) </a:t>
             </a:r>
-            <a:endParaRPr sz="1400">
+            <a:endParaRPr>
               <a:latin typeface="Lato"/>
               <a:ea typeface="Lato"/>
               <a:cs typeface="Lato"/>
@@ -2007,7 +2331,7 @@
             </a:endParaRPr>
           </a:p>
           <a:p>
-            <a:pPr indent="-317500" lvl="0" marL="457200" rtl="0">
+            <a:pPr indent="-298450" lvl="0" marL="457200" rtl="0">
               <a:lnSpc>
                 <a:spcPct val="115000"/>
               </a:lnSpc>
@@ -2020,12 +2344,12 @@
               <a:buClr>
                 <a:srgbClr val="000000"/>
               </a:buClr>
-              <a:buSzPts val="1400"/>
+              <a:buSzPts val="1100"/>
               <a:buFont typeface="Lato"/>
               <a:buChar char="●"/>
             </a:pPr>
             <a:r>
-              <a:rPr b="1" lang="en" sz="1400">
+              <a:rPr b="1" lang="en">
                 <a:latin typeface="Lato"/>
                 <a:ea typeface="Lato"/>
                 <a:cs typeface="Lato"/>
@@ -2033,7 +2357,7 @@
               </a:rPr>
               <a:t>Measurement destroys information</a:t>
             </a:r>
-            <a:endParaRPr b="1" sz="1400">
+            <a:endParaRPr b="1">
               <a:latin typeface="Lato"/>
               <a:ea typeface="Lato"/>
               <a:cs typeface="Lato"/>
@@ -2041,7 +2365,7 @@
             </a:endParaRPr>
           </a:p>
           <a:p>
-            <a:pPr indent="-317500" lvl="1" marL="914400" rtl="0">
+            <a:pPr indent="-298450" lvl="1" marL="914400" rtl="0">
               <a:lnSpc>
                 <a:spcPct val="115000"/>
               </a:lnSpc>
@@ -2054,12 +2378,12 @@
               <a:buClr>
                 <a:srgbClr val="000000"/>
               </a:buClr>
-              <a:buSzPts val="1400"/>
+              <a:buSzPts val="1100"/>
               <a:buFont typeface="Lato"/>
               <a:buChar char="○"/>
             </a:pPr>
             <a:r>
-              <a:rPr lang="en" sz="1400">
+              <a:rPr lang="en">
                 <a:latin typeface="Lato"/>
                 <a:ea typeface="Lato"/>
                 <a:cs typeface="Lato"/>
@@ -2067,7 +2391,7 @@
               </a:rPr>
               <a:t>Can observe classical output before applying correction</a:t>
             </a:r>
-            <a:endParaRPr sz="1400">
+            <a:endParaRPr>
               <a:latin typeface="Lato"/>
               <a:ea typeface="Lato"/>
               <a:cs typeface="Lato"/>
@@ -2075,7 +2399,7 @@
             </a:endParaRPr>
           </a:p>
           <a:p>
-            <a:pPr indent="-317500" lvl="1" marL="914400" rtl="0">
+            <a:pPr indent="-298450" lvl="1" marL="914400" rtl="0">
               <a:lnSpc>
                 <a:spcPct val="115000"/>
               </a:lnSpc>
@@ -2088,38 +2412,18 @@
               <a:buClr>
                 <a:srgbClr val="000000"/>
               </a:buClr>
-              <a:buSzPts val="1400"/>
+              <a:buSzPts val="1100"/>
               <a:buFont typeface="Lato"/>
               <a:buChar char="○"/>
             </a:pPr>
             <a:r>
-              <a:rPr lang="en" sz="1400">
+              <a:rPr lang="en">
                 <a:latin typeface="Lato"/>
                 <a:ea typeface="Lato"/>
                 <a:cs typeface="Lato"/>
                 <a:sym typeface="Lato"/>
               </a:rPr>
               <a:t>Cannot observe (measure) quantum data without collapsing state</a:t>
-            </a:r>
-            <a:endParaRPr sz="1400">
-              <a:latin typeface="Lato"/>
-              <a:ea typeface="Lato"/>
-              <a:cs typeface="Lato"/>
-              <a:sym typeface="Lato"/>
-            </a:endParaRPr>
-          </a:p>
-          <a:p>
-            <a:pPr indent="0" lvl="0" marL="0">
-              <a:spcBef>
-                <a:spcPts val="1600"/>
-              </a:spcBef>
-              <a:spcAft>
-                <a:spcPts val="0"/>
-              </a:spcAft>
-              <a:buNone/>
-            </a:pPr>
-            <a:r>
-              <a:t/>
             </a:r>
             <a:endParaRPr/>
           </a:p>
@@ -2138,7 +2442,7 @@
   <p:cSld>
     <p:spTree>
       <p:nvGrpSpPr>
-        <p:cNvPr id="150" name="Shape 150"/>
+        <p:cNvPr id="151" name="Shape 151"/>
         <p:cNvGrpSpPr/>
         <p:nvPr/>
       </p:nvGrpSpPr>
@@ -2152,7 +2456,7 @@
       </p:grpSpPr>
       <p:sp>
         <p:nvSpPr>
-          <p:cNvPr id="151" name="Shape 151"/>
+          <p:cNvPr id="152" name="Shape 152"/>
           <p:cNvSpPr/>
           <p:nvPr>
             <p:ph idx="2" type="sldImg"/>
@@ -2186,7 +2490,7 @@
       </p:sp>
       <p:sp>
         <p:nvSpPr>
-          <p:cNvPr id="152" name="Shape 152"/>
+          <p:cNvPr id="153" name="Shape 153"/>
           <p:cNvSpPr txBox="1"/>
           <p:nvPr>
             <p:ph idx="1" type="body"/>
@@ -2236,7 +2540,7 @@
   <p:cSld>
     <p:spTree>
       <p:nvGrpSpPr>
-        <p:cNvPr id="159" name="Shape 159"/>
+        <p:cNvPr id="160" name="Shape 160"/>
         <p:cNvGrpSpPr/>
         <p:nvPr/>
       </p:nvGrpSpPr>
@@ -2250,7 +2554,7 @@
       </p:grpSpPr>
       <p:sp>
         <p:nvSpPr>
-          <p:cNvPr id="160" name="Shape 160"/>
+          <p:cNvPr id="161" name="Shape 161"/>
           <p:cNvSpPr/>
           <p:nvPr>
             <p:ph idx="2" type="sldImg"/>
@@ -2284,7 +2588,7 @@
       </p:sp>
       <p:sp>
         <p:nvSpPr>
-          <p:cNvPr id="161" name="Shape 161"/>
+          <p:cNvPr id="162" name="Shape 162"/>
           <p:cNvSpPr txBox="1"/>
           <p:nvPr>
             <p:ph idx="1" type="body"/>
@@ -2315,9 +2619,346 @@
               <a:buNone/>
             </a:pPr>
             <a:r>
+              <a:rPr lang="en">
+                <a:latin typeface="Lato"/>
+                <a:ea typeface="Lato"/>
+                <a:cs typeface="Lato"/>
+                <a:sym typeface="Lato"/>
+              </a:rPr>
+              <a:t>We </a:t>
+            </a:r>
+            <a:r>
+              <a:rPr b="1" lang="en">
+                <a:latin typeface="Lato"/>
+                <a:ea typeface="Lato"/>
+                <a:cs typeface="Lato"/>
+                <a:sym typeface="Lato"/>
+              </a:rPr>
+              <a:t>encode the state of the logical qubit</a:t>
+            </a:r>
+            <a:r>
+              <a:rPr lang="en">
+                <a:latin typeface="Lato"/>
+                <a:ea typeface="Lato"/>
+                <a:cs typeface="Lato"/>
+                <a:sym typeface="Lato"/>
+              </a:rPr>
+              <a:t> as shown above, and then </a:t>
+            </a:r>
+            <a:r>
+              <a:rPr b="1" lang="en">
+                <a:latin typeface="Lato"/>
+                <a:ea typeface="Lato"/>
+                <a:cs typeface="Lato"/>
+                <a:sym typeface="Lato"/>
+              </a:rPr>
+              <a:t>detect for a bit flip error</a:t>
+            </a:r>
+            <a:r>
+              <a:rPr lang="en">
+                <a:latin typeface="Lato"/>
+                <a:ea typeface="Lato"/>
+                <a:cs typeface="Lato"/>
+                <a:sym typeface="Lato"/>
+              </a:rPr>
+              <a:t> using the ancillary qubits. This error detection scheme</a:t>
+            </a:r>
+            <a:r>
+              <a:rPr b="1" lang="en">
+                <a:latin typeface="Lato"/>
+                <a:ea typeface="Lato"/>
+                <a:cs typeface="Lato"/>
+                <a:sym typeface="Lato"/>
+              </a:rPr>
+              <a:t> assumes that errors only occur after encoding</a:t>
+            </a:r>
+            <a:r>
+              <a:rPr lang="en">
+                <a:latin typeface="Lato"/>
+                <a:ea typeface="Lato"/>
+                <a:cs typeface="Lato"/>
+                <a:sym typeface="Lato"/>
+              </a:rPr>
+              <a:t> (in other words, the </a:t>
+            </a:r>
+            <a:r>
+              <a:rPr b="1" lang="en">
+                <a:latin typeface="Lato"/>
+                <a:ea typeface="Lato"/>
+                <a:cs typeface="Lato"/>
+                <a:sym typeface="Lato"/>
+              </a:rPr>
+              <a:t>encoding is perfect</a:t>
+            </a:r>
+            <a:r>
+              <a:rPr lang="en">
+                <a:latin typeface="Lato"/>
+                <a:ea typeface="Lato"/>
+                <a:cs typeface="Lato"/>
+                <a:sym typeface="Lato"/>
+              </a:rPr>
+              <a:t>) and that </a:t>
+            </a:r>
+            <a:r>
+              <a:rPr b="1" lang="en">
+                <a:latin typeface="Lato"/>
+                <a:ea typeface="Lato"/>
+                <a:cs typeface="Lato"/>
+                <a:sym typeface="Lato"/>
+              </a:rPr>
+              <a:t>any error is a single bit flip</a:t>
+            </a:r>
+            <a:r>
+              <a:rPr lang="en">
+                <a:latin typeface="Lato"/>
+                <a:ea typeface="Lato"/>
+                <a:cs typeface="Lato"/>
+                <a:sym typeface="Lato"/>
+              </a:rPr>
+              <a:t> on exactly one of the non-ancillary qubits. </a:t>
+            </a:r>
+            <a:endParaRPr>
+              <a:latin typeface="Lato"/>
+              <a:ea typeface="Lato"/>
+              <a:cs typeface="Lato"/>
+              <a:sym typeface="Lato"/>
+            </a:endParaRPr>
+          </a:p>
+          <a:p>
+            <a:pPr indent="0" lvl="0" marL="0">
+              <a:spcBef>
+                <a:spcPts val="0"/>
+              </a:spcBef>
+              <a:spcAft>
+                <a:spcPts val="0"/>
+              </a:spcAft>
+              <a:buNone/>
+            </a:pPr>
+            <a:r>
               <a:t/>
             </a:r>
-            <a:endParaRPr/>
+            <a:endParaRPr>
+              <a:latin typeface="Lato"/>
+              <a:ea typeface="Lato"/>
+              <a:cs typeface="Lato"/>
+              <a:sym typeface="Lato"/>
+            </a:endParaRPr>
+          </a:p>
+          <a:p>
+            <a:pPr indent="0" lvl="0" marL="0">
+              <a:spcBef>
+                <a:spcPts val="0"/>
+              </a:spcBef>
+              <a:spcAft>
+                <a:spcPts val="0"/>
+              </a:spcAft>
+              <a:buNone/>
+            </a:pPr>
+            <a:r>
+              <a:rPr lang="en">
+                <a:latin typeface="Lato"/>
+                <a:ea typeface="Lato"/>
+                <a:cs typeface="Lato"/>
+                <a:sym typeface="Lato"/>
+              </a:rPr>
+              <a:t>This circuit is identical to the one above, except we </a:t>
+            </a:r>
+            <a:r>
+              <a:rPr b="1" lang="en">
+                <a:latin typeface="Lato"/>
+                <a:ea typeface="Lato"/>
+                <a:cs typeface="Lato"/>
+                <a:sym typeface="Lato"/>
+              </a:rPr>
+              <a:t>artificially introduce a bit flip error</a:t>
+            </a:r>
+            <a:r>
+              <a:rPr lang="en">
+                <a:latin typeface="Lato"/>
+                <a:ea typeface="Lato"/>
+                <a:cs typeface="Lato"/>
+                <a:sym typeface="Lato"/>
+              </a:rPr>
+              <a:t> on each of the three non-ancillary qubits </a:t>
+            </a:r>
+            <a:r>
+              <a:rPr b="1" lang="en">
+                <a:latin typeface="Lato"/>
+                <a:ea typeface="Lato"/>
+                <a:cs typeface="Lato"/>
+                <a:sym typeface="Lato"/>
+              </a:rPr>
+              <a:t>one at a time</a:t>
+            </a:r>
+            <a:r>
+              <a:rPr lang="en">
+                <a:latin typeface="Lato"/>
+                <a:ea typeface="Lato"/>
+                <a:cs typeface="Lato"/>
+                <a:sym typeface="Lato"/>
+              </a:rPr>
+              <a:t> to show that the error detection is working correctly. An </a:t>
+            </a:r>
+            <a:r>
+              <a:rPr b="1" lang="en">
+                <a:latin typeface="Lato"/>
+                <a:ea typeface="Lato"/>
+                <a:cs typeface="Lato"/>
+                <a:sym typeface="Lato"/>
+              </a:rPr>
+              <a:t>error on the first qubit </a:t>
+            </a:r>
+            <a:r>
+              <a:rPr lang="en">
+                <a:latin typeface="Lato"/>
+                <a:ea typeface="Lato"/>
+                <a:cs typeface="Lato"/>
+                <a:sym typeface="Lato"/>
+              </a:rPr>
+              <a:t>will flip both ancillary qubits; an </a:t>
+            </a:r>
+            <a:r>
+              <a:rPr b="1" lang="en">
+                <a:latin typeface="Lato"/>
+                <a:ea typeface="Lato"/>
+                <a:cs typeface="Lato"/>
+                <a:sym typeface="Lato"/>
+              </a:rPr>
+              <a:t>error on the second qubit</a:t>
+            </a:r>
+            <a:r>
+              <a:rPr lang="en">
+                <a:latin typeface="Lato"/>
+                <a:ea typeface="Lato"/>
+                <a:cs typeface="Lato"/>
+                <a:sym typeface="Lato"/>
+              </a:rPr>
+              <a:t> will flip only the first ancillary qubit; and an </a:t>
+            </a:r>
+            <a:r>
+              <a:rPr b="1" lang="en">
+                <a:latin typeface="Lato"/>
+                <a:ea typeface="Lato"/>
+                <a:cs typeface="Lato"/>
+                <a:sym typeface="Lato"/>
+              </a:rPr>
+              <a:t>error on the third qubit </a:t>
+            </a:r>
+            <a:r>
+              <a:rPr lang="en">
+                <a:latin typeface="Lato"/>
+                <a:ea typeface="Lato"/>
+                <a:cs typeface="Lato"/>
+                <a:sym typeface="Lato"/>
+              </a:rPr>
+              <a:t>will flip only the second ancillary qubit.</a:t>
+            </a:r>
+            <a:endParaRPr>
+              <a:latin typeface="Lato"/>
+              <a:ea typeface="Lato"/>
+              <a:cs typeface="Lato"/>
+              <a:sym typeface="Lato"/>
+            </a:endParaRPr>
+          </a:p>
+          <a:p>
+            <a:pPr indent="0" lvl="0" marL="0">
+              <a:spcBef>
+                <a:spcPts val="0"/>
+              </a:spcBef>
+              <a:spcAft>
+                <a:spcPts val="0"/>
+              </a:spcAft>
+              <a:buNone/>
+            </a:pPr>
+            <a:r>
+              <a:t/>
+            </a:r>
+            <a:endParaRPr>
+              <a:latin typeface="Lato"/>
+              <a:ea typeface="Lato"/>
+              <a:cs typeface="Lato"/>
+              <a:sym typeface="Lato"/>
+            </a:endParaRPr>
+          </a:p>
+          <a:p>
+            <a:pPr indent="0" lvl="0" marL="0">
+              <a:spcBef>
+                <a:spcPts val="0"/>
+              </a:spcBef>
+              <a:spcAft>
+                <a:spcPts val="0"/>
+              </a:spcAft>
+              <a:buNone/>
+            </a:pPr>
+            <a:r>
+              <a:rPr lang="en">
+                <a:latin typeface="Lato"/>
+                <a:ea typeface="Lato"/>
+                <a:cs typeface="Lato"/>
+                <a:sym typeface="Lato"/>
+              </a:rPr>
+              <a:t>Now in addition to detecting single bit flip errors, this circuit </a:t>
+            </a:r>
+            <a:r>
+              <a:rPr b="1" lang="en">
+                <a:latin typeface="Lato"/>
+                <a:ea typeface="Lato"/>
+                <a:cs typeface="Lato"/>
+                <a:sym typeface="Lato"/>
+              </a:rPr>
+              <a:t>adds a set of gates that apply a corrective operation</a:t>
+            </a:r>
+            <a:r>
+              <a:rPr lang="en">
+                <a:latin typeface="Lato"/>
+                <a:ea typeface="Lato"/>
+                <a:cs typeface="Lato"/>
+                <a:sym typeface="Lato"/>
+              </a:rPr>
+              <a:t>. Based on which ancillary qubits were flipped, we theoretically know exactly on which qubit the error occured. Therefore we can </a:t>
+            </a:r>
+            <a:r>
+              <a:rPr b="1" lang="en">
+                <a:latin typeface="Lato"/>
+                <a:ea typeface="Lato"/>
+                <a:cs typeface="Lato"/>
+                <a:sym typeface="Lato"/>
+              </a:rPr>
+              <a:t>use CNOT gates to correct the second and third qubits</a:t>
+            </a:r>
+            <a:r>
+              <a:rPr lang="en">
+                <a:latin typeface="Lato"/>
+                <a:ea typeface="Lato"/>
+                <a:cs typeface="Lato"/>
+                <a:sym typeface="Lato"/>
+              </a:rPr>
+              <a:t> (because only one ancillary qubit is flipped in either case) and</a:t>
+            </a:r>
+            <a:r>
+              <a:rPr b="1" lang="en">
+                <a:latin typeface="Lato"/>
+                <a:ea typeface="Lato"/>
+                <a:cs typeface="Lato"/>
+                <a:sym typeface="Lato"/>
+              </a:rPr>
+              <a:t> double CNOT gates to correct the first qubit </a:t>
+            </a:r>
+            <a:r>
+              <a:rPr lang="en">
+                <a:latin typeface="Lato"/>
+                <a:ea typeface="Lato"/>
+                <a:cs typeface="Lato"/>
+                <a:sym typeface="Lato"/>
+              </a:rPr>
+              <a:t>(because both ancillary qubits are flipped in this case).</a:t>
+            </a:r>
+            <a:endParaRPr>
+              <a:latin typeface="Lato"/>
+              <a:ea typeface="Lato"/>
+              <a:cs typeface="Lato"/>
+              <a:sym typeface="Lato"/>
+            </a:endParaRPr>
           </a:p>
         </p:txBody>
       </p:sp>
@@ -2334,7 +2975,7 @@
   <p:cSld>
     <p:spTree>
       <p:nvGrpSpPr>
-        <p:cNvPr id="166" name="Shape 166"/>
+        <p:cNvPr id="167" name="Shape 167"/>
         <p:cNvGrpSpPr/>
         <p:nvPr/>
       </p:nvGrpSpPr>
@@ -2348,7 +2989,7 @@
       </p:grpSpPr>
       <p:sp>
         <p:nvSpPr>
-          <p:cNvPr id="167" name="Shape 167"/>
+          <p:cNvPr id="168" name="Shape 168"/>
           <p:cNvSpPr/>
           <p:nvPr>
             <p:ph idx="2" type="sldImg"/>
@@ -2382,7 +3023,7 @@
       </p:sp>
       <p:sp>
         <p:nvSpPr>
-          <p:cNvPr id="168" name="Shape 168"/>
+          <p:cNvPr id="169" name="Shape 169"/>
           <p:cNvSpPr txBox="1"/>
           <p:nvPr>
             <p:ph idx="1" type="body"/>
@@ -2403,7 +3044,33 @@
           </a:bodyPr>
           <a:lstStyle/>
           <a:p>
-            <a:pPr indent="0" lvl="0" marL="0" rtl="0">
+            <a:pPr indent="0" lvl="0" marL="0">
+              <a:spcBef>
+                <a:spcPts val="0"/>
+              </a:spcBef>
+              <a:spcAft>
+                <a:spcPts val="0"/>
+              </a:spcAft>
+              <a:buNone/>
+            </a:pPr>
+            <a:r>
+              <a:rPr lang="en">
+                <a:latin typeface="Lato"/>
+                <a:ea typeface="Lato"/>
+                <a:cs typeface="Lato"/>
+                <a:sym typeface="Lato"/>
+              </a:rPr>
+              <a:t>We encode the state of the logical qubit as shown above, except apply a Hadamard gate first to create an arbitrary state. This is because a phase flip applied to the 0 state yields the 0 state again so it would be a trivial error. We then detect for a phase flip error using the ancillary qubits (a phase flip in the binary basis is equivalent to a bit flip in the Hadamard basis). Again this error detection scheme assumes that errors only occur after encoding (in other words, the encoding is perfect) and that any error is a single phase flip on exactly one of the non-ancillary qubits. </a:t>
+            </a:r>
+            <a:endParaRPr>
+              <a:latin typeface="Lato"/>
+              <a:ea typeface="Lato"/>
+              <a:cs typeface="Lato"/>
+              <a:sym typeface="Lato"/>
+            </a:endParaRPr>
+          </a:p>
+          <a:p>
+            <a:pPr indent="0" lvl="0" marL="0">
               <a:spcBef>
                 <a:spcPts val="0"/>
               </a:spcBef>
@@ -2415,7 +3082,38 @@
             <a:r>
               <a:t/>
             </a:r>
-            <a:endParaRPr/>
+            <a:endParaRPr>
+              <a:latin typeface="Lato"/>
+              <a:ea typeface="Lato"/>
+              <a:cs typeface="Lato"/>
+              <a:sym typeface="Lato"/>
+            </a:endParaRPr>
+          </a:p>
+          <a:p>
+            <a:pPr indent="0" lvl="0" marL="0" rtl="0">
+              <a:spcBef>
+                <a:spcPts val="0"/>
+              </a:spcBef>
+              <a:spcAft>
+                <a:spcPts val="0"/>
+              </a:spcAft>
+              <a:buNone/>
+            </a:pPr>
+            <a:r>
+              <a:rPr lang="en">
+                <a:latin typeface="Lato"/>
+                <a:ea typeface="Lato"/>
+                <a:cs typeface="Lato"/>
+                <a:sym typeface="Lato"/>
+              </a:rPr>
+              <a:t>Now in addition to detecting single bit flip errors, this circuit adds a set of gates that apply a corrective operation. Instead of changing to the Hadamard basis and then applying a bit flip (X gate) we just apply a phase flip in the binary basis (Z gate), so we can then use CNOT gates to correct the error. Based on which ancillary qubits were flipped, we theoretically know exactly on which qubit the error occured. The error correction process here is identical to the bit flip circuit, except we wrap each CNOT gate in Hadamard gates. This makes the gates behave like controlled Z gates.</a:t>
+            </a:r>
+            <a:endParaRPr>
+              <a:latin typeface="Lato"/>
+              <a:ea typeface="Lato"/>
+              <a:cs typeface="Lato"/>
+              <a:sym typeface="Lato"/>
+            </a:endParaRPr>
           </a:p>
         </p:txBody>
       </p:sp>
@@ -2432,7 +3130,7 @@
   <p:cSld>
     <p:spTree>
       <p:nvGrpSpPr>
-        <p:cNvPr id="173" name="Shape 173"/>
+        <p:cNvPr id="174" name="Shape 174"/>
         <p:cNvGrpSpPr/>
         <p:nvPr/>
       </p:nvGrpSpPr>
@@ -2446,7 +3144,7 @@
       </p:grpSpPr>
       <p:sp>
         <p:nvSpPr>
-          <p:cNvPr id="174" name="Shape 174"/>
+          <p:cNvPr id="175" name="Shape 175"/>
           <p:cNvSpPr/>
           <p:nvPr>
             <p:ph idx="2" type="sldImg"/>
@@ -2480,7 +3178,7 @@
       </p:sp>
       <p:sp>
         <p:nvSpPr>
-          <p:cNvPr id="175" name="Shape 175"/>
+          <p:cNvPr id="176" name="Shape 176"/>
           <p:cNvSpPr txBox="1"/>
           <p:nvPr>
             <p:ph idx="1" type="body"/>
@@ -2530,7 +3228,7 @@
   <p:cSld>
     <p:spTree>
       <p:nvGrpSpPr>
-        <p:cNvPr id="180" name="Shape 180"/>
+        <p:cNvPr id="181" name="Shape 181"/>
         <p:cNvGrpSpPr/>
         <p:nvPr/>
       </p:nvGrpSpPr>
@@ -2544,7 +3242,7 @@
       </p:grpSpPr>
       <p:sp>
         <p:nvSpPr>
-          <p:cNvPr id="181" name="Shape 181"/>
+          <p:cNvPr id="182" name="Shape 182"/>
           <p:cNvSpPr/>
           <p:nvPr>
             <p:ph idx="2" type="sldImg"/>
@@ -2578,7 +3276,7 @@
       </p:sp>
       <p:sp>
         <p:nvSpPr>
-          <p:cNvPr id="182" name="Shape 182"/>
+          <p:cNvPr id="183" name="Shape 183"/>
           <p:cNvSpPr txBox="1"/>
           <p:nvPr>
             <p:ph idx="1" type="body"/>
@@ -2628,7 +3326,7 @@
   <p:cSld>
     <p:spTree>
       <p:nvGrpSpPr>
-        <p:cNvPr id="186" name="Shape 186"/>
+        <p:cNvPr id="187" name="Shape 187"/>
         <p:cNvGrpSpPr/>
         <p:nvPr/>
       </p:nvGrpSpPr>
@@ -2642,7 +3340,7 @@
       </p:grpSpPr>
       <p:sp>
         <p:nvSpPr>
-          <p:cNvPr id="187" name="Shape 187"/>
+          <p:cNvPr id="188" name="Shape 188"/>
           <p:cNvSpPr/>
           <p:nvPr>
             <p:ph idx="2" type="sldImg"/>
@@ -2676,7 +3374,7 @@
       </p:sp>
       <p:sp>
         <p:nvSpPr>
-          <p:cNvPr id="188" name="Shape 188"/>
+          <p:cNvPr id="189" name="Shape 189"/>
           <p:cNvSpPr txBox="1"/>
           <p:nvPr>
             <p:ph idx="1" type="body"/>
@@ -11060,7 +11758,7 @@
   <p:cSld>
     <p:spTree>
       <p:nvGrpSpPr>
-        <p:cNvPr id="195" name="Shape 195"/>
+        <p:cNvPr id="196" name="Shape 196"/>
         <p:cNvGrpSpPr/>
         <p:nvPr/>
       </p:nvGrpSpPr>
@@ -11074,7 +11772,7 @@
       </p:grpSpPr>
       <p:sp>
         <p:nvSpPr>
-          <p:cNvPr id="196" name="Shape 196"/>
+          <p:cNvPr id="197" name="Shape 197"/>
           <p:cNvSpPr txBox="1"/>
           <p:nvPr>
             <p:ph type="title"/>
@@ -11122,7 +11820,7 @@
       </p:sp>
       <p:pic>
         <p:nvPicPr>
-          <p:cNvPr id="197" name="Shape 197"/>
+          <p:cNvPr id="198" name="Shape 198"/>
           <p:cNvPicPr preferRelativeResize="0"/>
           <p:nvPr/>
         </p:nvPicPr>
@@ -11150,7 +11848,7 @@
       </p:pic>
       <p:sp>
         <p:nvSpPr>
-          <p:cNvPr id="198" name="Shape 198"/>
+          <p:cNvPr id="199" name="Shape 199"/>
           <p:cNvSpPr/>
           <p:nvPr/>
         </p:nvSpPr>
@@ -11210,7 +11908,7 @@
       </p:sp>
       <p:pic>
         <p:nvPicPr>
-          <p:cNvPr id="199" name="Shape 199"/>
+          <p:cNvPr id="200" name="Shape 200"/>
           <p:cNvPicPr preferRelativeResize="0"/>
           <p:nvPr/>
         </p:nvPicPr>
@@ -11248,7 +11946,7 @@
   <p:cSld>
     <p:spTree>
       <p:nvGrpSpPr>
-        <p:cNvPr id="203" name="Shape 203"/>
+        <p:cNvPr id="204" name="Shape 204"/>
         <p:cNvGrpSpPr/>
         <p:nvPr/>
       </p:nvGrpSpPr>
@@ -11262,7 +11960,7 @@
       </p:grpSpPr>
       <p:sp>
         <p:nvSpPr>
-          <p:cNvPr id="204" name="Shape 204"/>
+          <p:cNvPr id="205" name="Shape 205"/>
           <p:cNvSpPr txBox="1"/>
           <p:nvPr>
             <p:ph type="title"/>
@@ -11302,7 +12000,7 @@
       </p:sp>
       <p:pic>
         <p:nvPicPr>
-          <p:cNvPr id="205" name="Shape 205"/>
+          <p:cNvPr id="206" name="Shape 206"/>
           <p:cNvPicPr preferRelativeResize="0"/>
           <p:nvPr/>
         </p:nvPicPr>
@@ -11341,7 +12039,7 @@
   <p:cSld>
     <p:spTree>
       <p:nvGrpSpPr>
-        <p:cNvPr id="209" name="Shape 209"/>
+        <p:cNvPr id="210" name="Shape 210"/>
         <p:cNvGrpSpPr/>
         <p:nvPr/>
       </p:nvGrpSpPr>
@@ -11355,7 +12053,7 @@
       </p:grpSpPr>
       <p:sp>
         <p:nvSpPr>
-          <p:cNvPr id="210" name="Shape 210"/>
+          <p:cNvPr id="211" name="Shape 211"/>
           <p:cNvSpPr txBox="1"/>
           <p:nvPr>
             <p:ph type="title"/>
@@ -11395,7 +12093,7 @@
       </p:sp>
       <p:pic>
         <p:nvPicPr>
-          <p:cNvPr id="211" name="Shape 211"/>
+          <p:cNvPr id="212" name="Shape 212"/>
           <p:cNvPicPr preferRelativeResize="0"/>
           <p:nvPr/>
         </p:nvPicPr>
@@ -11434,7 +12132,7 @@
   <p:cSld>
     <p:spTree>
       <p:nvGrpSpPr>
-        <p:cNvPr id="215" name="Shape 215"/>
+        <p:cNvPr id="216" name="Shape 216"/>
         <p:cNvGrpSpPr/>
         <p:nvPr/>
       </p:nvGrpSpPr>
@@ -11448,7 +12146,7 @@
       </p:grpSpPr>
       <p:sp>
         <p:nvSpPr>
-          <p:cNvPr id="216" name="Shape 216"/>
+          <p:cNvPr id="217" name="Shape 217"/>
           <p:cNvSpPr txBox="1"/>
           <p:nvPr>
             <p:ph type="title"/>
@@ -11488,7 +12186,7 @@
       </p:sp>
       <p:sp>
         <p:nvSpPr>
-          <p:cNvPr id="217" name="Shape 217"/>
+          <p:cNvPr id="218" name="Shape 218"/>
           <p:cNvSpPr txBox="1"/>
           <p:nvPr/>
         </p:nvSpPr>
@@ -11730,7 +12428,7 @@
       </p:sp>
       <p:pic>
         <p:nvPicPr>
-          <p:cNvPr id="218" name="Shape 218"/>
+          <p:cNvPr id="219" name="Shape 219"/>
           <p:cNvPicPr preferRelativeResize="0"/>
           <p:nvPr/>
         </p:nvPicPr>
@@ -11758,7 +12456,7 @@
       </p:pic>
       <p:cxnSp>
         <p:nvCxnSpPr>
-          <p:cNvPr id="219" name="Shape 219"/>
+          <p:cNvPr id="220" name="Shape 220"/>
           <p:cNvCxnSpPr/>
           <p:nvPr/>
         </p:nvCxnSpPr>
@@ -11784,7 +12482,7 @@
       </p:cxnSp>
       <p:sp>
         <p:nvSpPr>
-          <p:cNvPr id="220" name="Shape 220"/>
+          <p:cNvPr id="221" name="Shape 221"/>
           <p:cNvSpPr txBox="1"/>
           <p:nvPr/>
         </p:nvSpPr>
@@ -11836,7 +12534,7 @@
       </p:sp>
       <p:sp>
         <p:nvSpPr>
-          <p:cNvPr id="221" name="Shape 221"/>
+          <p:cNvPr id="222" name="Shape 222"/>
           <p:cNvSpPr txBox="1"/>
           <p:nvPr/>
         </p:nvSpPr>
@@ -11899,7 +12597,7 @@
   <p:cSld>
     <p:spTree>
       <p:nvGrpSpPr>
-        <p:cNvPr id="225" name="Shape 225"/>
+        <p:cNvPr id="226" name="Shape 226"/>
         <p:cNvGrpSpPr/>
         <p:nvPr/>
       </p:nvGrpSpPr>
@@ -11913,7 +12611,7 @@
       </p:grpSpPr>
       <p:sp>
         <p:nvSpPr>
-          <p:cNvPr id="226" name="Shape 226"/>
+          <p:cNvPr id="227" name="Shape 227"/>
           <p:cNvSpPr txBox="1"/>
           <p:nvPr>
             <p:ph type="title"/>
@@ -11953,7 +12651,7 @@
       </p:sp>
       <p:sp>
         <p:nvSpPr>
-          <p:cNvPr id="227" name="Shape 227"/>
+          <p:cNvPr id="228" name="Shape 228"/>
           <p:cNvSpPr txBox="1"/>
           <p:nvPr/>
         </p:nvSpPr>
@@ -12191,7 +12889,7 @@
   <p:cSld>
     <p:spTree>
       <p:nvGrpSpPr>
-        <p:cNvPr id="231" name="Shape 231"/>
+        <p:cNvPr id="232" name="Shape 232"/>
         <p:cNvGrpSpPr/>
         <p:nvPr/>
       </p:nvGrpSpPr>
@@ -12205,7 +12903,7 @@
       </p:grpSpPr>
       <p:sp>
         <p:nvSpPr>
-          <p:cNvPr id="232" name="Shape 232"/>
+          <p:cNvPr id="233" name="Shape 233"/>
           <p:cNvSpPr txBox="1"/>
           <p:nvPr>
             <p:ph type="title"/>
@@ -12245,7 +12943,7 @@
       </p:sp>
       <p:pic>
         <p:nvPicPr>
-          <p:cNvPr id="233" name="Shape 233"/>
+          <p:cNvPr id="234" name="Shape 234"/>
           <p:cNvPicPr preferRelativeResize="0"/>
           <p:nvPr/>
         </p:nvPicPr>
@@ -12284,7 +12982,7 @@
   <p:cSld>
     <p:spTree>
       <p:nvGrpSpPr>
-        <p:cNvPr id="237" name="Shape 237"/>
+        <p:cNvPr id="238" name="Shape 238"/>
         <p:cNvGrpSpPr/>
         <p:nvPr/>
       </p:nvGrpSpPr>
@@ -12298,7 +12996,7 @@
       </p:grpSpPr>
       <p:sp>
         <p:nvSpPr>
-          <p:cNvPr id="238" name="Shape 238"/>
+          <p:cNvPr id="239" name="Shape 239"/>
           <p:cNvSpPr txBox="1"/>
           <p:nvPr>
             <p:ph type="title"/>
@@ -12330,7 +13028,7 @@
             </a:pPr>
             <a:r>
               <a:rPr lang="en"/>
-              <a:t>Looking Ahead</a:t>
+              <a:t>Looking ahead</a:t>
             </a:r>
             <a:endParaRPr/>
           </a:p>
@@ -12338,7 +13036,7 @@
       </p:sp>
       <p:sp>
         <p:nvSpPr>
-          <p:cNvPr id="239" name="Shape 239"/>
+          <p:cNvPr id="240" name="Shape 240"/>
           <p:cNvSpPr txBox="1"/>
           <p:nvPr/>
         </p:nvSpPr>
@@ -12387,7 +13085,7 @@
       </p:sp>
       <p:pic>
         <p:nvPicPr>
-          <p:cNvPr id="240" name="Shape 240"/>
+          <p:cNvPr id="241" name="Shape 241"/>
           <p:cNvPicPr preferRelativeResize="0"/>
           <p:nvPr/>
         </p:nvPicPr>
@@ -12426,7 +13124,7 @@
   <p:cSld>
     <p:spTree>
       <p:nvGrpSpPr>
-        <p:cNvPr id="244" name="Shape 244"/>
+        <p:cNvPr id="245" name="Shape 245"/>
         <p:cNvGrpSpPr/>
         <p:nvPr/>
       </p:nvGrpSpPr>
@@ -12440,7 +13138,7 @@
       </p:grpSpPr>
       <p:sp>
         <p:nvSpPr>
-          <p:cNvPr id="245" name="Shape 245"/>
+          <p:cNvPr id="246" name="Shape 246"/>
           <p:cNvSpPr txBox="1"/>
           <p:nvPr>
             <p:ph type="title"/>
@@ -12448,7 +13146,7 @@
         </p:nvSpPr>
         <p:spPr>
           <a:xfrm>
-            <a:off x="514450" y="2299825"/>
+            <a:off x="513750" y="1270950"/>
             <a:ext cx="4776000" cy="1300800"/>
           </a:xfrm>
           <a:prstGeom prst="rect">
@@ -12478,6 +13176,33 @@
           </a:p>
         </p:txBody>
       </p:sp>
+      <p:pic>
+        <p:nvPicPr>
+          <p:cNvPr id="247" name="Shape 247"/>
+          <p:cNvPicPr preferRelativeResize="0"/>
+          <p:nvPr/>
+        </p:nvPicPr>
+        <p:blipFill rotWithShape="1">
+          <a:blip r:embed="rId3">
+            <a:alphaModFix/>
+          </a:blip>
+          <a:srcRect b="0" l="0" r="1941" t="57524"/>
+          <a:stretch/>
+        </p:blipFill>
+        <p:spPr>
+          <a:xfrm>
+            <a:off x="513750" y="2924225"/>
+            <a:ext cx="5851850" cy="1901126"/>
+          </a:xfrm>
+          <a:prstGeom prst="rect">
+            <a:avLst/>
+          </a:prstGeom>
+          <a:noFill/>
+          <a:ln>
+            <a:noFill/>
+          </a:ln>
+        </p:spPr>
+      </p:pic>
     </p:spTree>
   </p:cSld>
   <p:clrMapOvr>
@@ -12553,8 +13278,8 @@
         </p:nvSpPr>
         <p:spPr>
           <a:xfrm>
-            <a:off x="1064400" y="1151800"/>
-            <a:ext cx="4131300" cy="3600300"/>
+            <a:off x="766625" y="1427025"/>
+            <a:ext cx="4688400" cy="3600300"/>
           </a:xfrm>
           <a:prstGeom prst="rect">
             <a:avLst/>
@@ -12566,169 +13291,169 @@
           </a:bodyPr>
           <a:lstStyle/>
           <a:p>
-            <a:pPr indent="-317500" lvl="0" marL="457200" rtl="0">
-              <a:spcBef>
-                <a:spcPts val="0"/>
-              </a:spcBef>
-              <a:spcAft>
-                <a:spcPts val="0"/>
-              </a:spcAft>
-              <a:buSzPts val="1400"/>
+            <a:pPr indent="-342900" lvl="0" marL="457200" rtl="0">
+              <a:spcBef>
+                <a:spcPts val="0"/>
+              </a:spcBef>
+              <a:spcAft>
+                <a:spcPts val="0"/>
+              </a:spcAft>
+              <a:buSzPts val="1800"/>
               <a:buChar char="●"/>
             </a:pPr>
             <a:r>
-              <a:rPr lang="en" sz="1400"/>
+              <a:rPr lang="en" sz="1800"/>
               <a:t>General</a:t>
             </a:r>
             <a:r>
-              <a:rPr lang="en" sz="1400"/>
+              <a:rPr lang="en" sz="1800"/>
               <a:t> idea</a:t>
             </a:r>
-            <a:endParaRPr sz="1400"/>
+            <a:endParaRPr sz="1800"/>
           </a:p>
           <a:p>
-            <a:pPr indent="-317500" lvl="1" marL="914400" rtl="0">
-              <a:spcBef>
-                <a:spcPts val="0"/>
-              </a:spcBef>
-              <a:spcAft>
-                <a:spcPts val="0"/>
-              </a:spcAft>
-              <a:buSzPts val="1400"/>
+            <a:pPr indent="-342900" lvl="1" marL="914400" rtl="0">
+              <a:spcBef>
+                <a:spcPts val="0"/>
+              </a:spcBef>
+              <a:spcAft>
+                <a:spcPts val="0"/>
+              </a:spcAft>
+              <a:buSzPts val="1800"/>
               <a:buChar char="○"/>
             </a:pPr>
             <a:r>
-              <a:rPr lang="en" sz="1400"/>
+              <a:rPr lang="en" sz="1800"/>
               <a:t>Message = bit sequence</a:t>
             </a:r>
-            <a:endParaRPr sz="1400"/>
+            <a:endParaRPr sz="1800"/>
           </a:p>
           <a:p>
-            <a:pPr indent="-317500" lvl="1" marL="914400" rtl="0">
-              <a:spcBef>
-                <a:spcPts val="0"/>
-              </a:spcBef>
-              <a:spcAft>
-                <a:spcPts val="0"/>
-              </a:spcAft>
-              <a:buSzPts val="1400"/>
+            <a:pPr indent="-342900" lvl="1" marL="914400" rtl="0">
+              <a:spcBef>
+                <a:spcPts val="0"/>
+              </a:spcBef>
+              <a:spcAft>
+                <a:spcPts val="0"/>
+              </a:spcAft>
+              <a:buSzPts val="1800"/>
               <a:buChar char="○"/>
             </a:pPr>
             <a:r>
-              <a:rPr lang="en" sz="1400"/>
-              <a:t>Encode a message with some redundancy</a:t>
+              <a:rPr lang="en" sz="1800"/>
+              <a:t>Encoding</a:t>
             </a:r>
-            <a:endParaRPr sz="1400"/>
+            <a:endParaRPr sz="1800"/>
           </a:p>
           <a:p>
-            <a:pPr indent="-317500" lvl="1" marL="914400" rtl="0">
-              <a:spcBef>
-                <a:spcPts val="0"/>
-              </a:spcBef>
-              <a:spcAft>
-                <a:spcPts val="0"/>
-              </a:spcAft>
-              <a:buSzPts val="1400"/>
+            <a:pPr indent="-342900" lvl="1" marL="914400" rtl="0">
+              <a:spcBef>
+                <a:spcPts val="0"/>
+              </a:spcBef>
+              <a:spcAft>
+                <a:spcPts val="0"/>
+              </a:spcAft>
+              <a:buSzPts val="1800"/>
               <a:buChar char="○"/>
             </a:pPr>
             <a:r>
-              <a:rPr lang="en" sz="1400"/>
-              <a:t>Some of the message may be corrupted</a:t>
+              <a:rPr lang="en" sz="1800"/>
+              <a:t>Detection</a:t>
             </a:r>
-            <a:endParaRPr sz="1400"/>
+            <a:endParaRPr sz="1800"/>
           </a:p>
           <a:p>
-            <a:pPr indent="-317500" lvl="1" marL="914400" rtl="0">
-              <a:spcBef>
-                <a:spcPts val="0"/>
-              </a:spcBef>
-              <a:spcAft>
-                <a:spcPts val="0"/>
-              </a:spcAft>
-              <a:buSzPts val="1400"/>
+            <a:pPr indent="-342900" lvl="1" marL="914400" rtl="0">
+              <a:spcBef>
+                <a:spcPts val="0"/>
+              </a:spcBef>
+              <a:spcAft>
+                <a:spcPts val="0"/>
+              </a:spcAft>
+              <a:buSzPts val="1800"/>
               <a:buChar char="○"/>
             </a:pPr>
             <a:r>
-              <a:rPr lang="en" sz="1400"/>
-              <a:t>Enough redundancy that original message is recoverable</a:t>
+              <a:rPr lang="en" sz="1800"/>
+              <a:t>Correction / recovery</a:t>
             </a:r>
-            <a:endParaRPr sz="1400"/>
+            <a:endParaRPr sz="1800"/>
           </a:p>
           <a:p>
-            <a:pPr indent="-317500" lvl="0" marL="457200" rtl="0">
-              <a:spcBef>
-                <a:spcPts val="0"/>
-              </a:spcBef>
-              <a:spcAft>
-                <a:spcPts val="0"/>
-              </a:spcAft>
-              <a:buSzPts val="1400"/>
+            <a:pPr indent="-342900" lvl="0" marL="457200" rtl="0">
+              <a:spcBef>
+                <a:spcPts val="0"/>
+              </a:spcBef>
+              <a:spcAft>
+                <a:spcPts val="0"/>
+              </a:spcAft>
+              <a:buSzPts val="1800"/>
               <a:buChar char="●"/>
             </a:pPr>
             <a:r>
-              <a:rPr lang="en" sz="1400"/>
+              <a:rPr lang="en" sz="1800"/>
               <a:t>Binary symmetric channel</a:t>
             </a:r>
-            <a:endParaRPr sz="1400"/>
+            <a:endParaRPr sz="1800"/>
           </a:p>
           <a:p>
-            <a:pPr indent="-317500" lvl="1" marL="914400" rtl="0">
-              <a:spcBef>
-                <a:spcPts val="0"/>
-              </a:spcBef>
-              <a:spcAft>
-                <a:spcPts val="0"/>
-              </a:spcAft>
-              <a:buSzPts val="1400"/>
+            <a:pPr indent="-342900" lvl="1" marL="914400" rtl="0">
+              <a:spcBef>
+                <a:spcPts val="0"/>
+              </a:spcBef>
+              <a:spcAft>
+                <a:spcPts val="0"/>
+              </a:spcAft>
+              <a:buSzPts val="1800"/>
               <a:buChar char="○"/>
             </a:pPr>
             <a:r>
-              <a:rPr lang="en" sz="1400"/>
+              <a:rPr lang="en" sz="1800"/>
               <a:t>0 → 000</a:t>
             </a:r>
-            <a:endParaRPr sz="1400"/>
+            <a:endParaRPr sz="1800"/>
           </a:p>
           <a:p>
-            <a:pPr indent="-317500" lvl="1" marL="914400" rtl="0">
-              <a:spcBef>
-                <a:spcPts val="0"/>
-              </a:spcBef>
-              <a:spcAft>
-                <a:spcPts val="0"/>
-              </a:spcAft>
-              <a:buSzPts val="1400"/>
+            <a:pPr indent="-342900" lvl="1" marL="914400" rtl="0">
+              <a:spcBef>
+                <a:spcPts val="0"/>
+              </a:spcBef>
+              <a:spcAft>
+                <a:spcPts val="0"/>
+              </a:spcAft>
+              <a:buSzPts val="1800"/>
               <a:buChar char="○"/>
             </a:pPr>
             <a:r>
-              <a:rPr lang="en" sz="1400"/>
+              <a:rPr lang="en" sz="1800"/>
               <a:t>1 → 111</a:t>
             </a:r>
-            <a:endParaRPr sz="1400"/>
+            <a:endParaRPr sz="1800"/>
           </a:p>
           <a:p>
-            <a:pPr indent="-317500" lvl="1" marL="914400">
-              <a:spcBef>
-                <a:spcPts val="0"/>
-              </a:spcBef>
-              <a:spcAft>
-                <a:spcPts val="0"/>
-              </a:spcAft>
-              <a:buSzPts val="1400"/>
+            <a:pPr indent="-342900" lvl="1" marL="914400">
+              <a:spcBef>
+                <a:spcPts val="0"/>
+              </a:spcBef>
+              <a:spcAft>
+                <a:spcPts val="0"/>
+              </a:spcAft>
+              <a:buSzPts val="1800"/>
               <a:buChar char="○"/>
             </a:pPr>
             <a:r>
-              <a:rPr lang="en" sz="1400"/>
-              <a:t>Because error probability </a:t>
+              <a:rPr lang="en" sz="1800"/>
+              <a:t>Small error probability </a:t>
             </a:r>
             <a:r>
-              <a:rPr i="1" lang="en" sz="1400"/>
+              <a:rPr i="1" lang="en" sz="1800"/>
               <a:t>p</a:t>
             </a:r>
             <a:r>
-              <a:rPr lang="en" sz="1400"/>
-              <a:t> is small, only single bit likely to be flipped</a:t>
+              <a:rPr lang="en" sz="1800"/>
+              <a:t> </a:t>
             </a:r>
-            <a:endParaRPr sz="1400"/>
+            <a:endParaRPr sz="1800"/>
           </a:p>
         </p:txBody>
       </p:sp>
@@ -12748,7 +13473,7 @@
         </p:blipFill>
         <p:spPr>
           <a:xfrm>
-            <a:off x="5496375" y="1988775"/>
+            <a:off x="5341850" y="1976325"/>
             <a:ext cx="3156850" cy="2068750"/>
           </a:xfrm>
           <a:prstGeom prst="rect">
@@ -12835,8 +13560,8 @@
         </p:nvSpPr>
         <p:spPr>
           <a:xfrm>
-            <a:off x="1297500" y="1374175"/>
-            <a:ext cx="7181700" cy="3165000"/>
+            <a:off x="1297500" y="1734375"/>
+            <a:ext cx="3458400" cy="3213900"/>
           </a:xfrm>
           <a:prstGeom prst="rect">
             <a:avLst/>
@@ -12848,7 +13573,47 @@
           </a:bodyPr>
           <a:lstStyle/>
           <a:p>
-            <a:pPr indent="-317500" lvl="0" marL="457200" rtl="0">
+            <a:pPr indent="-342900" lvl="0" marL="457200" rtl="0">
+              <a:lnSpc>
+                <a:spcPct val="200000"/>
+              </a:lnSpc>
+              <a:spcBef>
+                <a:spcPts val="0"/>
+              </a:spcBef>
+              <a:spcAft>
+                <a:spcPts val="0"/>
+              </a:spcAft>
+              <a:buSzPts val="1800"/>
+              <a:buAutoNum type="arabicPeriod"/>
+            </a:pPr>
+            <a:r>
+              <a:rPr lang="en" sz="1800"/>
+              <a:t>No cloning of states</a:t>
+            </a:r>
+            <a:endParaRPr sz="1800"/>
+          </a:p>
+          <a:p>
+            <a:pPr indent="-342900" lvl="0" marL="457200" marR="0" rtl="0" algn="l">
+              <a:lnSpc>
+                <a:spcPct val="200000"/>
+              </a:lnSpc>
+              <a:spcBef>
+                <a:spcPts val="0"/>
+              </a:spcBef>
+              <a:spcAft>
+                <a:spcPts val="0"/>
+              </a:spcAft>
+              <a:buSzPts val="1800"/>
+              <a:buAutoNum type="arabicPeriod"/>
+            </a:pPr>
+            <a:r>
+              <a:rPr lang="en" sz="1800"/>
+              <a:t>Errors are continuous	</a:t>
+            </a:r>
+            <a:endParaRPr sz="1800"/>
+          </a:p>
+          <a:p>
+            <a:pPr indent="-342900" lvl="0" marL="457200" marR="0" rtl="0" algn="l">
               <a:lnSpc>
                 <a:spcPct val="150000"/>
               </a:lnSpc>
@@ -12858,57 +13623,45 @@
               <a:spcAft>
                 <a:spcPts val="0"/>
               </a:spcAft>
-              <a:buSzPts val="1400"/>
+              <a:buSzPts val="1800"/>
               <a:buAutoNum type="arabicPeriod"/>
             </a:pPr>
             <a:r>
-              <a:rPr lang="en" sz="1400"/>
-              <a:t>No cloning states</a:t>
-            </a:r>
-            <a:endParaRPr sz="1400"/>
-          </a:p>
-          <a:p>
-            <a:pPr indent="-317500" lvl="0" marL="457200" marR="0" rtl="0" algn="l">
-              <a:lnSpc>
-                <a:spcPct val="150000"/>
-              </a:lnSpc>
-              <a:spcBef>
-                <a:spcPts val="0"/>
-              </a:spcBef>
-              <a:spcAft>
-                <a:spcPts val="0"/>
-              </a:spcAft>
-              <a:buSzPts val="1400"/>
-              <a:buAutoNum type="arabicPeriod"/>
-            </a:pPr>
-            <a:r>
-              <a:rPr lang="en" sz="1400"/>
-              <a:t>Errors are continuous	</a:t>
-            </a:r>
-            <a:endParaRPr sz="1400"/>
-          </a:p>
-          <a:p>
-            <a:pPr indent="-317500" lvl="0" marL="457200" marR="0" rtl="0" algn="l">
-              <a:lnSpc>
-                <a:spcPct val="150000"/>
-              </a:lnSpc>
-              <a:spcBef>
-                <a:spcPts val="0"/>
-              </a:spcBef>
-              <a:spcAft>
-                <a:spcPts val="0"/>
-              </a:spcAft>
-              <a:buSzPts val="1400"/>
-              <a:buAutoNum type="arabicPeriod"/>
-            </a:pPr>
-            <a:r>
-              <a:rPr lang="en" sz="1400"/>
+              <a:rPr lang="en" sz="1800"/>
               <a:t>Measurement destroys information</a:t>
             </a:r>
-            <a:endParaRPr sz="1400"/>
+            <a:endParaRPr sz="1800"/>
           </a:p>
         </p:txBody>
       </p:sp>
+      <p:pic>
+        <p:nvPicPr>
+          <p:cNvPr id="150" name="Shape 150"/>
+          <p:cNvPicPr preferRelativeResize="0"/>
+          <p:nvPr/>
+        </p:nvPicPr>
+        <p:blipFill>
+          <a:blip r:embed="rId3">
+            <a:alphaModFix/>
+          </a:blip>
+          <a:stretch>
+            <a:fillRect/>
+          </a:stretch>
+        </p:blipFill>
+        <p:spPr>
+          <a:xfrm>
+            <a:off x="5118700" y="1555825"/>
+            <a:ext cx="3096950" cy="2625800"/>
+          </a:xfrm>
+          <a:prstGeom prst="rect">
+            <a:avLst/>
+          </a:prstGeom>
+          <a:noFill/>
+          <a:ln>
+            <a:noFill/>
+          </a:ln>
+        </p:spPr>
+      </p:pic>
     </p:spTree>
   </p:cSld>
   <p:clrMapOvr>
@@ -12922,7 +13675,7 @@
   <p:cSld>
     <p:spTree>
       <p:nvGrpSpPr>
-        <p:cNvPr id="153" name="Shape 153"/>
+        <p:cNvPr id="154" name="Shape 154"/>
         <p:cNvGrpSpPr/>
         <p:nvPr/>
       </p:nvGrpSpPr>
@@ -12936,7 +13689,7 @@
       </p:grpSpPr>
       <p:sp>
         <p:nvSpPr>
-          <p:cNvPr id="154" name="Shape 154"/>
+          <p:cNvPr id="155" name="Shape 155"/>
           <p:cNvSpPr txBox="1"/>
           <p:nvPr>
             <p:ph type="title"/>
@@ -12976,7 +13729,7 @@
       </p:sp>
       <p:pic>
         <p:nvPicPr>
-          <p:cNvPr id="155" name="Shape 155"/>
+          <p:cNvPr id="156" name="Shape 156"/>
           <p:cNvPicPr preferRelativeResize="0"/>
           <p:nvPr/>
         </p:nvPicPr>
@@ -13004,7 +13757,7 @@
       </p:pic>
       <p:pic>
         <p:nvPicPr>
-          <p:cNvPr id="156" name="Shape 156"/>
+          <p:cNvPr id="157" name="Shape 157"/>
           <p:cNvPicPr preferRelativeResize="0"/>
           <p:nvPr/>
         </p:nvPicPr>
@@ -13032,7 +13785,7 @@
       </p:pic>
       <p:pic>
         <p:nvPicPr>
-          <p:cNvPr id="157" name="Shape 157"/>
+          <p:cNvPr id="158" name="Shape 158"/>
           <p:cNvPicPr preferRelativeResize="0"/>
           <p:nvPr/>
         </p:nvPicPr>
@@ -13060,7 +13813,7 @@
       </p:pic>
       <p:sp>
         <p:nvSpPr>
-          <p:cNvPr id="158" name="Shape 158"/>
+          <p:cNvPr id="159" name="Shape 159"/>
           <p:cNvSpPr txBox="1"/>
           <p:nvPr>
             <p:ph idx="1" type="body"/>
@@ -13068,8 +13821,8 @@
         </p:nvSpPr>
         <p:spPr>
           <a:xfrm>
-            <a:off x="692625" y="2865125"/>
-            <a:ext cx="4303800" cy="2049600"/>
+            <a:off x="530375" y="2865125"/>
+            <a:ext cx="4772400" cy="2049600"/>
           </a:xfrm>
           <a:prstGeom prst="rect">
             <a:avLst/>
@@ -13081,26 +13834,29 @@
           </a:bodyPr>
           <a:lstStyle/>
           <a:p>
-            <a:pPr indent="-317500" lvl="0" marL="457200" rtl="0">
-              <a:spcBef>
-                <a:spcPts val="0"/>
-              </a:spcBef>
-              <a:spcAft>
-                <a:spcPts val="0"/>
-              </a:spcAft>
-              <a:buSzPts val="1400"/>
+            <a:pPr indent="-330200" lvl="0" marL="457200" rtl="0">
+              <a:lnSpc>
+                <a:spcPct val="150000"/>
+              </a:lnSpc>
+              <a:spcBef>
+                <a:spcPts val="0"/>
+              </a:spcBef>
+              <a:spcAft>
+                <a:spcPts val="0"/>
+              </a:spcAft>
+              <a:buSzPts val="1600"/>
               <a:buChar char="●"/>
             </a:pPr>
             <a:r>
-              <a:rPr lang="en" sz="1400"/>
+              <a:rPr lang="en" sz="1600"/>
               <a:t>Single “logical” qubit mapped to three qubits</a:t>
             </a:r>
-            <a:endParaRPr sz="1400"/>
+            <a:endParaRPr sz="1600"/>
           </a:p>
           <a:p>
-            <a:pPr indent="-317500" lvl="0" marL="457200" marR="0" rtl="0" algn="l">
+            <a:pPr indent="-330200" lvl="0" marL="457200" marR="0" rtl="0" algn="l">
               <a:lnSpc>
-                <a:spcPct val="115000"/>
+                <a:spcPct val="150000"/>
               </a:lnSpc>
               <a:spcBef>
                 <a:spcPts val="0"/>
@@ -13111,20 +13867,20 @@
               <a:buClr>
                 <a:schemeClr val="lt1"/>
               </a:buClr>
-              <a:buSzPts val="1400"/>
+              <a:buSzPts val="1600"/>
               <a:buFont typeface="Lato"/>
               <a:buChar char="●"/>
             </a:pPr>
             <a:r>
-              <a:rPr lang="en" sz="1400"/>
-              <a:t>Quantum state is preserved (alpha and beta still unknown)</a:t>
+              <a:rPr lang="en" sz="1600"/>
+              <a:t>Quantum state is preserved </a:t>
             </a:r>
-            <a:endParaRPr sz="1400"/>
+            <a:endParaRPr sz="1600"/>
           </a:p>
           <a:p>
-            <a:pPr indent="-317500" lvl="0" marL="457200" marR="0" rtl="0" algn="l">
+            <a:pPr indent="-330200" lvl="0" marL="457200" marR="0" rtl="0" algn="l">
               <a:lnSpc>
-                <a:spcPct val="115000"/>
+                <a:spcPct val="150000"/>
               </a:lnSpc>
               <a:spcBef>
                 <a:spcPts val="0"/>
@@ -13132,14 +13888,18 @@
               <a:spcAft>
                 <a:spcPts val="0"/>
               </a:spcAft>
-              <a:buSzPts val="1400"/>
+              <a:buClr>
+                <a:schemeClr val="lt1"/>
+              </a:buClr>
+              <a:buSzPts val="1600"/>
+              <a:buFont typeface="Lato"/>
               <a:buChar char="●"/>
             </a:pPr>
             <a:r>
-              <a:rPr lang="en" sz="1400"/>
+              <a:rPr lang="en" sz="1600"/>
               <a:t>Redundancy introduced via duplication not repetition</a:t>
             </a:r>
-            <a:endParaRPr sz="1400"/>
+            <a:endParaRPr sz="1600"/>
           </a:p>
           <a:p>
             <a:pPr indent="0" lvl="0" marL="0" marR="0" rtl="0" algn="l">
@@ -13157,7 +13917,7 @@
             <a:r>
               <a:t/>
             </a:r>
-            <a:endParaRPr sz="1400"/>
+            <a:endParaRPr sz="1600"/>
           </a:p>
         </p:txBody>
       </p:sp>
@@ -13174,7 +13934,7 @@
   <p:cSld>
     <p:spTree>
       <p:nvGrpSpPr>
-        <p:cNvPr id="162" name="Shape 162"/>
+        <p:cNvPr id="163" name="Shape 163"/>
         <p:cNvGrpSpPr/>
         <p:nvPr/>
       </p:nvGrpSpPr>
@@ -13188,7 +13948,7 @@
       </p:grpSpPr>
       <p:sp>
         <p:nvSpPr>
-          <p:cNvPr id="163" name="Shape 163"/>
+          <p:cNvPr id="164" name="Shape 164"/>
           <p:cNvSpPr txBox="1"/>
           <p:nvPr>
             <p:ph type="title"/>
@@ -13228,7 +13988,7 @@
       </p:sp>
       <p:pic>
         <p:nvPicPr>
-          <p:cNvPr id="164" name="Shape 164"/>
+          <p:cNvPr id="165" name="Shape 165"/>
           <p:cNvPicPr preferRelativeResize="0"/>
           <p:nvPr/>
         </p:nvPicPr>
@@ -13256,7 +14016,7 @@
       </p:pic>
       <p:pic>
         <p:nvPicPr>
-          <p:cNvPr id="165" name="Shape 165"/>
+          <p:cNvPr id="166" name="Shape 166"/>
           <p:cNvPicPr preferRelativeResize="0"/>
           <p:nvPr/>
         </p:nvPicPr>
@@ -13295,7 +14055,7 @@
   <p:cSld>
     <p:spTree>
       <p:nvGrpSpPr>
-        <p:cNvPr id="169" name="Shape 169"/>
+        <p:cNvPr id="170" name="Shape 170"/>
         <p:cNvGrpSpPr/>
         <p:nvPr/>
       </p:nvGrpSpPr>
@@ -13309,7 +14069,7 @@
       </p:grpSpPr>
       <p:sp>
         <p:nvSpPr>
-          <p:cNvPr id="170" name="Shape 170"/>
+          <p:cNvPr id="171" name="Shape 171"/>
           <p:cNvSpPr txBox="1"/>
           <p:nvPr>
             <p:ph type="title"/>
@@ -13349,7 +14109,7 @@
       </p:sp>
       <p:pic>
         <p:nvPicPr>
-          <p:cNvPr id="171" name="Shape 171"/>
+          <p:cNvPr id="172" name="Shape 172"/>
           <p:cNvPicPr preferRelativeResize="0"/>
           <p:nvPr/>
         </p:nvPicPr>
@@ -13377,7 +14137,7 @@
       </p:pic>
       <p:pic>
         <p:nvPicPr>
-          <p:cNvPr id="172" name="Shape 172"/>
+          <p:cNvPr id="173" name="Shape 173"/>
           <p:cNvPicPr preferRelativeResize="0"/>
           <p:nvPr/>
         </p:nvPicPr>
@@ -13390,8 +14150,8 @@
         </p:blipFill>
         <p:spPr>
           <a:xfrm>
-            <a:off x="4132450" y="1736950"/>
-            <a:ext cx="439550" cy="2138674"/>
+            <a:off x="4323375" y="1902600"/>
+            <a:ext cx="302999" cy="1474275"/>
           </a:xfrm>
           <a:prstGeom prst="rect">
             <a:avLst/>
@@ -13415,7 +14175,7 @@
   <p:cSld>
     <p:spTree>
       <p:nvGrpSpPr>
-        <p:cNvPr id="176" name="Shape 176"/>
+        <p:cNvPr id="177" name="Shape 177"/>
         <p:cNvGrpSpPr/>
         <p:nvPr/>
       </p:nvGrpSpPr>
@@ -13429,7 +14189,7 @@
       </p:grpSpPr>
       <p:sp>
         <p:nvSpPr>
-          <p:cNvPr id="177" name="Shape 177"/>
+          <p:cNvPr id="178" name="Shape 178"/>
           <p:cNvSpPr txBox="1"/>
           <p:nvPr>
             <p:ph type="title"/>
@@ -13469,7 +14229,7 @@
       </p:sp>
       <p:pic>
         <p:nvPicPr>
-          <p:cNvPr id="178" name="Shape 178"/>
+          <p:cNvPr id="179" name="Shape 179"/>
           <p:cNvPicPr preferRelativeResize="0"/>
           <p:nvPr/>
         </p:nvPicPr>
@@ -13497,7 +14257,7 @@
       </p:pic>
       <p:pic>
         <p:nvPicPr>
-          <p:cNvPr id="179" name="Shape 179"/>
+          <p:cNvPr id="180" name="Shape 180"/>
           <p:cNvPicPr preferRelativeResize="0"/>
           <p:nvPr/>
         </p:nvPicPr>
@@ -13536,7 +14296,7 @@
   <p:cSld>
     <p:spTree>
       <p:nvGrpSpPr>
-        <p:cNvPr id="183" name="Shape 183"/>
+        <p:cNvPr id="184" name="Shape 184"/>
         <p:cNvGrpSpPr/>
         <p:nvPr/>
       </p:nvGrpSpPr>
@@ -13550,7 +14310,7 @@
       </p:grpSpPr>
       <p:sp>
         <p:nvSpPr>
-          <p:cNvPr id="184" name="Shape 184"/>
+          <p:cNvPr id="185" name="Shape 185"/>
           <p:cNvSpPr txBox="1"/>
           <p:nvPr>
             <p:ph type="title"/>
@@ -13590,7 +14350,7 @@
       </p:sp>
       <p:pic>
         <p:nvPicPr>
-          <p:cNvPr id="185" name="Shape 185"/>
+          <p:cNvPr id="186" name="Shape 186"/>
           <p:cNvPicPr preferRelativeResize="0"/>
           <p:nvPr/>
         </p:nvPicPr>
@@ -13629,7 +14389,7 @@
   <p:cSld>
     <p:spTree>
       <p:nvGrpSpPr>
-        <p:cNvPr id="189" name="Shape 189"/>
+        <p:cNvPr id="190" name="Shape 190"/>
         <p:cNvGrpSpPr/>
         <p:nvPr/>
       </p:nvGrpSpPr>
@@ -13643,7 +14403,7 @@
       </p:grpSpPr>
       <p:sp>
         <p:nvSpPr>
-          <p:cNvPr id="190" name="Shape 190"/>
+          <p:cNvPr id="191" name="Shape 191"/>
           <p:cNvSpPr txBox="1"/>
           <p:nvPr>
             <p:ph type="title"/>
@@ -13683,7 +14443,7 @@
       </p:sp>
       <p:pic>
         <p:nvPicPr>
-          <p:cNvPr id="191" name="Shape 191"/>
+          <p:cNvPr id="192" name="Shape 192"/>
           <p:cNvPicPr preferRelativeResize="0"/>
           <p:nvPr/>
         </p:nvPicPr>
@@ -13718,6 +14478,285 @@
 </file>
 
 <file path=ppt/theme/theme1.xml><?xml version="1.0" encoding="utf-8"?>
+<a:theme xmlns:a="http://schemas.openxmlformats.org/drawingml/2006/main" xmlns:r="http://schemas.openxmlformats.org/officeDocument/2006/relationships">
+  <a:themeElements>
+    <a:clrScheme name="Default">
+      <a:dk1>
+        <a:srgbClr val="000000"/>
+      </a:dk1>
+      <a:lt1>
+        <a:srgbClr val="FFFFFF"/>
+      </a:lt1>
+      <a:dk2>
+        <a:srgbClr val="158158"/>
+      </a:dk2>
+      <a:lt2>
+        <a:srgbClr val="F3F3F3"/>
+      </a:lt2>
+      <a:accent1>
+        <a:srgbClr val="058DC7"/>
+      </a:accent1>
+      <a:accent2>
+        <a:srgbClr val="50B432"/>
+      </a:accent2>
+      <a:accent3>
+        <a:srgbClr val="ED561B"/>
+      </a:accent3>
+      <a:accent4>
+        <a:srgbClr val="EDEF00"/>
+      </a:accent4>
+      <a:accent5>
+        <a:srgbClr val="24CBE5"/>
+      </a:accent5>
+      <a:accent6>
+        <a:srgbClr val="64E572"/>
+      </a:accent6>
+      <a:hlink>
+        <a:srgbClr val="2200CC"/>
+      </a:hlink>
+      <a:folHlink>
+        <a:srgbClr val="551A8B"/>
+      </a:folHlink>
+    </a:clrScheme>
+    <a:fontScheme name="Office">
+      <a:majorFont>
+        <a:latin typeface="Arial"/>
+        <a:ea typeface=""/>
+        <a:cs typeface=""/>
+        <a:font script="Jpan" typeface="ＭＳ Ｐゴシック"/>
+        <a:font script="Hang" typeface="맑은 고딕"/>
+        <a:font script="Hans" typeface="宋体"/>
+        <a:font script="Hant" typeface="新細明體"/>
+        <a:font script="Arab" typeface="Times New Roman"/>
+        <a:font script="Hebr" typeface="Times New Roman"/>
+        <a:font script="Thai" typeface="Angsana New"/>
+        <a:font script="Ethi" typeface="Nyala"/>
+        <a:font script="Beng" typeface="Vrinda"/>
+        <a:font script="Gujr" typeface="Shruti"/>
+        <a:font script="Khmr" typeface="MoolBoran"/>
+        <a:font script="Knda" typeface="Tunga"/>
+        <a:font script="Guru" typeface="Raavi"/>
+        <a:font script="Cans" typeface="Euphemia"/>
+        <a:font script="Cher" typeface="Plantagenet Cherokee"/>
+        <a:font script="Yiii" typeface="Microsoft Yi Baiti"/>
+        <a:font script="Tibt" typeface="Microsoft Himalaya"/>
+        <a:font script="Thaa" typeface="MV Boli"/>
+        <a:font script="Deva" typeface="Mangal"/>
+        <a:font script="Telu" typeface="Gautami"/>
+        <a:font script="Taml" typeface="Latha"/>
+        <a:font script="Syrc" typeface="Estrangelo Edessa"/>
+        <a:font script="Orya" typeface="Kalinga"/>
+        <a:font script="Mlym" typeface="Kartika"/>
+        <a:font script="Laoo" typeface="DokChampa"/>
+        <a:font script="Sinh" typeface="Iskoola Pota"/>
+        <a:font script="Mong" typeface="Mongolian Baiti"/>
+        <a:font script="Viet" typeface="Times New Roman"/>
+        <a:font script="Uigh" typeface="Microsoft Uighur"/>
+        <a:font script="Geor" typeface="Sylfaen"/>
+      </a:majorFont>
+      <a:minorFont>
+        <a:latin typeface="Arial"/>
+        <a:ea typeface=""/>
+        <a:cs typeface=""/>
+        <a:font script="Jpan" typeface="ＭＳ Ｐゴシック"/>
+        <a:font script="Hang" typeface="맑은 고딕"/>
+        <a:font script="Hans" typeface="宋体"/>
+        <a:font script="Hant" typeface="新細明體"/>
+        <a:font script="Arab" typeface="Arial"/>
+        <a:font script="Hebr" typeface="Arial"/>
+        <a:font script="Thai" typeface="Cordia New"/>
+        <a:font script="Ethi" typeface="Nyala"/>
+        <a:font script="Beng" typeface="Vrinda"/>
+        <a:font script="Gujr" typeface="Shruti"/>
+        <a:font script="Khmr" typeface="DaunPenh"/>
+        <a:font script="Knda" typeface="Tunga"/>
+        <a:font script="Guru" typeface="Raavi"/>
+        <a:font script="Cans" typeface="Euphemia"/>
+        <a:font script="Cher" typeface="Plantagenet Cherokee"/>
+        <a:font script="Yiii" typeface="Microsoft Yi Baiti"/>
+        <a:font script="Tibt" typeface="Microsoft Himalaya"/>
+        <a:font script="Thaa" typeface="MV Boli"/>
+        <a:font script="Deva" typeface="Mangal"/>
+        <a:font script="Telu" typeface="Gautami"/>
+        <a:font script="Taml" typeface="Latha"/>
+        <a:font script="Syrc" typeface="Estrangelo Edessa"/>
+        <a:font script="Orya" typeface="Kalinga"/>
+        <a:font script="Mlym" typeface="Kartika"/>
+        <a:font script="Laoo" typeface="DokChampa"/>
+        <a:font script="Sinh" typeface="Iskoola Pota"/>
+        <a:font script="Mong" typeface="Mongolian Baiti"/>
+        <a:font script="Viet" typeface="Arial"/>
+        <a:font script="Uigh" typeface="Microsoft Uighur"/>
+        <a:font script="Geor" typeface="Sylfaen"/>
+      </a:minorFont>
+    </a:fontScheme>
+    <a:fmtScheme name="Office">
+      <a:fillStyleLst>
+        <a:solidFill>
+          <a:schemeClr val="phClr"/>
+        </a:solidFill>
+        <a:gradFill rotWithShape="1">
+          <a:gsLst>
+            <a:gs pos="0">
+              <a:schemeClr val="phClr">
+                <a:tint val="50000"/>
+                <a:satMod val="300000"/>
+              </a:schemeClr>
+            </a:gs>
+            <a:gs pos="35000">
+              <a:schemeClr val="phClr">
+                <a:tint val="37000"/>
+                <a:satMod val="300000"/>
+              </a:schemeClr>
+            </a:gs>
+            <a:gs pos="100000">
+              <a:schemeClr val="phClr">
+                <a:tint val="15000"/>
+                <a:satMod val="350000"/>
+              </a:schemeClr>
+            </a:gs>
+          </a:gsLst>
+          <a:lin ang="16200000" scaled="1"/>
+        </a:gradFill>
+        <a:gradFill rotWithShape="1">
+          <a:gsLst>
+            <a:gs pos="0">
+              <a:schemeClr val="phClr">
+                <a:tint val="100000"/>
+                <a:shade val="100000"/>
+                <a:satMod val="130000"/>
+              </a:schemeClr>
+            </a:gs>
+            <a:gs pos="100000">
+              <a:schemeClr val="phClr">
+                <a:tint val="50000"/>
+                <a:shade val="100000"/>
+                <a:satMod val="350000"/>
+              </a:schemeClr>
+            </a:gs>
+          </a:gsLst>
+          <a:lin ang="16200000" scaled="0"/>
+        </a:gradFill>
+      </a:fillStyleLst>
+      <a:lnStyleLst>
+        <a:ln w="9525" cap="flat" cmpd="sng" algn="ctr">
+          <a:solidFill>
+            <a:schemeClr val="phClr">
+              <a:shade val="95000"/>
+              <a:satMod val="105000"/>
+            </a:schemeClr>
+          </a:solidFill>
+          <a:prstDash val="solid"/>
+        </a:ln>
+        <a:ln w="25400" cap="flat" cmpd="sng" algn="ctr">
+          <a:solidFill>
+            <a:schemeClr val="phClr"/>
+          </a:solidFill>
+          <a:prstDash val="solid"/>
+        </a:ln>
+        <a:ln w="38100" cap="flat" cmpd="sng" algn="ctr">
+          <a:solidFill>
+            <a:schemeClr val="phClr"/>
+          </a:solidFill>
+          <a:prstDash val="solid"/>
+        </a:ln>
+      </a:lnStyleLst>
+      <a:effectStyleLst>
+        <a:effectStyle>
+          <a:effectLst>
+            <a:outerShdw blurRad="40000" dist="20000" dir="5400000" rotWithShape="0">
+              <a:srgbClr val="000000">
+                <a:alpha val="38000"/>
+              </a:srgbClr>
+            </a:outerShdw>
+          </a:effectLst>
+        </a:effectStyle>
+        <a:effectStyle>
+          <a:effectLst>
+            <a:outerShdw blurRad="40000" dist="23000" dir="5400000" rotWithShape="0">
+              <a:srgbClr val="000000">
+                <a:alpha val="35000"/>
+              </a:srgbClr>
+            </a:outerShdw>
+          </a:effectLst>
+        </a:effectStyle>
+        <a:effectStyle>
+          <a:effectLst>
+            <a:outerShdw blurRad="40000" dist="23000" dir="5400000" rotWithShape="0">
+              <a:srgbClr val="000000">
+                <a:alpha val="35000"/>
+              </a:srgbClr>
+            </a:outerShdw>
+          </a:effectLst>
+          <a:scene3d>
+            <a:camera prst="orthographicFront">
+              <a:rot lat="0" lon="0" rev="0"/>
+            </a:camera>
+            <a:lightRig rig="threePt" dir="t">
+              <a:rot lat="0" lon="0" rev="1200000"/>
+            </a:lightRig>
+          </a:scene3d>
+          <a:sp3d>
+            <a:bevelT w="63500" h="25400"/>
+          </a:sp3d>
+        </a:effectStyle>
+      </a:effectStyleLst>
+      <a:bgFillStyleLst>
+        <a:solidFill>
+          <a:schemeClr val="phClr"/>
+        </a:solidFill>
+        <a:gradFill rotWithShape="1">
+          <a:gsLst>
+            <a:gs pos="0">
+              <a:schemeClr val="phClr">
+                <a:tint val="40000"/>
+                <a:satMod val="350000"/>
+              </a:schemeClr>
+            </a:gs>
+            <a:gs pos="40000">
+              <a:schemeClr val="phClr">
+                <a:tint val="45000"/>
+                <a:shade val="99000"/>
+                <a:satMod val="350000"/>
+              </a:schemeClr>
+            </a:gs>
+            <a:gs pos="100000">
+              <a:schemeClr val="phClr">
+                <a:shade val="20000"/>
+                <a:satMod val="255000"/>
+              </a:schemeClr>
+            </a:gs>
+          </a:gsLst>
+          <a:path path="circle">
+            <a:fillToRect l="50000" t="-80000" r="50000" b="180000"/>
+          </a:path>
+        </a:gradFill>
+        <a:gradFill rotWithShape="1">
+          <a:gsLst>
+            <a:gs pos="0">
+              <a:schemeClr val="phClr">
+                <a:tint val="80000"/>
+                <a:satMod val="300000"/>
+              </a:schemeClr>
+            </a:gs>
+            <a:gs pos="100000">
+              <a:schemeClr val="phClr">
+                <a:shade val="30000"/>
+                <a:satMod val="200000"/>
+              </a:schemeClr>
+            </a:gs>
+          </a:gsLst>
+          <a:path path="circle">
+            <a:fillToRect l="50000" t="50000" r="50000" b="50000"/>
+          </a:path>
+        </a:gradFill>
+      </a:bgFillStyleLst>
+    </a:fmtScheme>
+  </a:themeElements>
+</a:theme>
+</file>
+
+<file path=ppt/theme/theme2.xml><?xml version="1.0" encoding="utf-8"?>
 <a:theme xmlns:a="http://schemas.openxmlformats.org/drawingml/2006/main" xmlns:r="http://schemas.openxmlformats.org/officeDocument/2006/relationships" name="Focus">
   <a:themeElements>
     <a:clrScheme name="Focus">
@@ -13994,283 +15033,4 @@
     </a:fmtScheme>
   </a:themeElements>
 </a:theme>
-</file>
-
-<file path=ppt/theme/theme2.xml><?xml version="1.0" encoding="utf-8"?>
-<a:theme xmlns:a="http://schemas.openxmlformats.org/drawingml/2006/main" xmlns:r="http://schemas.openxmlformats.org/officeDocument/2006/relationships">
-  <a:themeElements>
-    <a:clrScheme name="Default">
-      <a:dk1>
-        <a:srgbClr val="000000"/>
-      </a:dk1>
-      <a:lt1>
-        <a:srgbClr val="FFFFFF"/>
-      </a:lt1>
-      <a:dk2>
-        <a:srgbClr val="158158"/>
-      </a:dk2>
-      <a:lt2>
-        <a:srgbClr val="F3F3F3"/>
-      </a:lt2>
-      <a:accent1>
-        <a:srgbClr val="058DC7"/>
-      </a:accent1>
-      <a:accent2>
-        <a:srgbClr val="50B432"/>
-      </a:accent2>
-      <a:accent3>
-        <a:srgbClr val="ED561B"/>
-      </a:accent3>
-      <a:accent4>
-        <a:srgbClr val="EDEF00"/>
-      </a:accent4>
-      <a:accent5>
-        <a:srgbClr val="24CBE5"/>
-      </a:accent5>
-      <a:accent6>
-        <a:srgbClr val="64E572"/>
-      </a:accent6>
-      <a:hlink>
-        <a:srgbClr val="2200CC"/>
-      </a:hlink>
-      <a:folHlink>
-        <a:srgbClr val="551A8B"/>
-      </a:folHlink>
-    </a:clrScheme>
-    <a:fontScheme name="Office">
-      <a:majorFont>
-        <a:latin typeface="Arial"/>
-        <a:ea typeface=""/>
-        <a:cs typeface=""/>
-        <a:font script="Jpan" typeface="ＭＳ Ｐゴシック"/>
-        <a:font script="Hang" typeface="맑은 고딕"/>
-        <a:font script="Hans" typeface="宋体"/>
-        <a:font script="Hant" typeface="新細明體"/>
-        <a:font script="Arab" typeface="Times New Roman"/>
-        <a:font script="Hebr" typeface="Times New Roman"/>
-        <a:font script="Thai" typeface="Angsana New"/>
-        <a:font script="Ethi" typeface="Nyala"/>
-        <a:font script="Beng" typeface="Vrinda"/>
-        <a:font script="Gujr" typeface="Shruti"/>
-        <a:font script="Khmr" typeface="MoolBoran"/>
-        <a:font script="Knda" typeface="Tunga"/>
-        <a:font script="Guru" typeface="Raavi"/>
-        <a:font script="Cans" typeface="Euphemia"/>
-        <a:font script="Cher" typeface="Plantagenet Cherokee"/>
-        <a:font script="Yiii" typeface="Microsoft Yi Baiti"/>
-        <a:font script="Tibt" typeface="Microsoft Himalaya"/>
-        <a:font script="Thaa" typeface="MV Boli"/>
-        <a:font script="Deva" typeface="Mangal"/>
-        <a:font script="Telu" typeface="Gautami"/>
-        <a:font script="Taml" typeface="Latha"/>
-        <a:font script="Syrc" typeface="Estrangelo Edessa"/>
-        <a:font script="Orya" typeface="Kalinga"/>
-        <a:font script="Mlym" typeface="Kartika"/>
-        <a:font script="Laoo" typeface="DokChampa"/>
-        <a:font script="Sinh" typeface="Iskoola Pota"/>
-        <a:font script="Mong" typeface="Mongolian Baiti"/>
-        <a:font script="Viet" typeface="Times New Roman"/>
-        <a:font script="Uigh" typeface="Microsoft Uighur"/>
-        <a:font script="Geor" typeface="Sylfaen"/>
-      </a:majorFont>
-      <a:minorFont>
-        <a:latin typeface="Arial"/>
-        <a:ea typeface=""/>
-        <a:cs typeface=""/>
-        <a:font script="Jpan" typeface="ＭＳ Ｐゴシック"/>
-        <a:font script="Hang" typeface="맑은 고딕"/>
-        <a:font script="Hans" typeface="宋体"/>
-        <a:font script="Hant" typeface="新細明體"/>
-        <a:font script="Arab" typeface="Arial"/>
-        <a:font script="Hebr" typeface="Arial"/>
-        <a:font script="Thai" typeface="Cordia New"/>
-        <a:font script="Ethi" typeface="Nyala"/>
-        <a:font script="Beng" typeface="Vrinda"/>
-        <a:font script="Gujr" typeface="Shruti"/>
-        <a:font script="Khmr" typeface="DaunPenh"/>
-        <a:font script="Knda" typeface="Tunga"/>
-        <a:font script="Guru" typeface="Raavi"/>
-        <a:font script="Cans" typeface="Euphemia"/>
-        <a:font script="Cher" typeface="Plantagenet Cherokee"/>
-        <a:font script="Yiii" typeface="Microsoft Yi Baiti"/>
-        <a:font script="Tibt" typeface="Microsoft Himalaya"/>
-        <a:font script="Thaa" typeface="MV Boli"/>
-        <a:font script="Deva" typeface="Mangal"/>
-        <a:font script="Telu" typeface="Gautami"/>
-        <a:font script="Taml" typeface="Latha"/>
-        <a:font script="Syrc" typeface="Estrangelo Edessa"/>
-        <a:font script="Orya" typeface="Kalinga"/>
-        <a:font script="Mlym" typeface="Kartika"/>
-        <a:font script="Laoo" typeface="DokChampa"/>
-        <a:font script="Sinh" typeface="Iskoola Pota"/>
-        <a:font script="Mong" typeface="Mongolian Baiti"/>
-        <a:font script="Viet" typeface="Arial"/>
-        <a:font script="Uigh" typeface="Microsoft Uighur"/>
-        <a:font script="Geor" typeface="Sylfaen"/>
-      </a:minorFont>
-    </a:fontScheme>
-    <a:fmtScheme name="Office">
-      <a:fillStyleLst>
-        <a:solidFill>
-          <a:schemeClr val="phClr"/>
-        </a:solidFill>
-        <a:gradFill rotWithShape="1">
-          <a:gsLst>
-            <a:gs pos="0">
-              <a:schemeClr val="phClr">
-                <a:tint val="50000"/>
-                <a:satMod val="300000"/>
-              </a:schemeClr>
-            </a:gs>
-            <a:gs pos="35000">
-              <a:schemeClr val="phClr">
-                <a:tint val="37000"/>
-                <a:satMod val="300000"/>
-              </a:schemeClr>
-            </a:gs>
-            <a:gs pos="100000">
-              <a:schemeClr val="phClr">
-                <a:tint val="15000"/>
-                <a:satMod val="350000"/>
-              </a:schemeClr>
-            </a:gs>
-          </a:gsLst>
-          <a:lin ang="16200000" scaled="1"/>
-        </a:gradFill>
-        <a:gradFill rotWithShape="1">
-          <a:gsLst>
-            <a:gs pos="0">
-              <a:schemeClr val="phClr">
-                <a:tint val="100000"/>
-                <a:shade val="100000"/>
-                <a:satMod val="130000"/>
-              </a:schemeClr>
-            </a:gs>
-            <a:gs pos="100000">
-              <a:schemeClr val="phClr">
-                <a:tint val="50000"/>
-                <a:shade val="100000"/>
-                <a:satMod val="350000"/>
-              </a:schemeClr>
-            </a:gs>
-          </a:gsLst>
-          <a:lin ang="16200000" scaled="0"/>
-        </a:gradFill>
-      </a:fillStyleLst>
-      <a:lnStyleLst>
-        <a:ln w="9525" cap="flat" cmpd="sng" algn="ctr">
-          <a:solidFill>
-            <a:schemeClr val="phClr">
-              <a:shade val="95000"/>
-              <a:satMod val="105000"/>
-            </a:schemeClr>
-          </a:solidFill>
-          <a:prstDash val="solid"/>
-        </a:ln>
-        <a:ln w="25400" cap="flat" cmpd="sng" algn="ctr">
-          <a:solidFill>
-            <a:schemeClr val="phClr"/>
-          </a:solidFill>
-          <a:prstDash val="solid"/>
-        </a:ln>
-        <a:ln w="38100" cap="flat" cmpd="sng" algn="ctr">
-          <a:solidFill>
-            <a:schemeClr val="phClr"/>
-          </a:solidFill>
-          <a:prstDash val="solid"/>
-        </a:ln>
-      </a:lnStyleLst>
-      <a:effectStyleLst>
-        <a:effectStyle>
-          <a:effectLst>
-            <a:outerShdw blurRad="40000" dist="20000" dir="5400000" rotWithShape="0">
-              <a:srgbClr val="000000">
-                <a:alpha val="38000"/>
-              </a:srgbClr>
-            </a:outerShdw>
-          </a:effectLst>
-        </a:effectStyle>
-        <a:effectStyle>
-          <a:effectLst>
-            <a:outerShdw blurRad="40000" dist="23000" dir="5400000" rotWithShape="0">
-              <a:srgbClr val="000000">
-                <a:alpha val="35000"/>
-              </a:srgbClr>
-            </a:outerShdw>
-          </a:effectLst>
-        </a:effectStyle>
-        <a:effectStyle>
-          <a:effectLst>
-            <a:outerShdw blurRad="40000" dist="23000" dir="5400000" rotWithShape="0">
-              <a:srgbClr val="000000">
-                <a:alpha val="35000"/>
-              </a:srgbClr>
-            </a:outerShdw>
-          </a:effectLst>
-          <a:scene3d>
-            <a:camera prst="orthographicFront">
-              <a:rot lat="0" lon="0" rev="0"/>
-            </a:camera>
-            <a:lightRig rig="threePt" dir="t">
-              <a:rot lat="0" lon="0" rev="1200000"/>
-            </a:lightRig>
-          </a:scene3d>
-          <a:sp3d>
-            <a:bevelT w="63500" h="25400"/>
-          </a:sp3d>
-        </a:effectStyle>
-      </a:effectStyleLst>
-      <a:bgFillStyleLst>
-        <a:solidFill>
-          <a:schemeClr val="phClr"/>
-        </a:solidFill>
-        <a:gradFill rotWithShape="1">
-          <a:gsLst>
-            <a:gs pos="0">
-              <a:schemeClr val="phClr">
-                <a:tint val="40000"/>
-                <a:satMod val="350000"/>
-              </a:schemeClr>
-            </a:gs>
-            <a:gs pos="40000">
-              <a:schemeClr val="phClr">
-                <a:tint val="45000"/>
-                <a:shade val="99000"/>
-                <a:satMod val="350000"/>
-              </a:schemeClr>
-            </a:gs>
-            <a:gs pos="100000">
-              <a:schemeClr val="phClr">
-                <a:shade val="20000"/>
-                <a:satMod val="255000"/>
-              </a:schemeClr>
-            </a:gs>
-          </a:gsLst>
-          <a:path path="circle">
-            <a:fillToRect l="50000" t="-80000" r="50000" b="180000"/>
-          </a:path>
-        </a:gradFill>
-        <a:gradFill rotWithShape="1">
-          <a:gsLst>
-            <a:gs pos="0">
-              <a:schemeClr val="phClr">
-                <a:tint val="80000"/>
-                <a:satMod val="300000"/>
-              </a:schemeClr>
-            </a:gs>
-            <a:gs pos="100000">
-              <a:schemeClr val="phClr">
-                <a:shade val="30000"/>
-                <a:satMod val="200000"/>
-              </a:schemeClr>
-            </a:gs>
-          </a:gsLst>
-          <a:path path="circle">
-            <a:fillToRect l="50000" t="50000" r="50000" b="50000"/>
-          </a:path>
-        </a:gradFill>
-      </a:bgFillStyleLst>
-    </a:fmtScheme>
-  </a:themeElements>
-</a:theme>
 </file>
</xml_diff>

<commit_message>
Alaisha messing around round 3
</commit_message>
<xml_diff>
--- a/QEC Final Project.pptx
+++ b/QEC Final Project.pptx
@@ -3060,7 +3060,61 @@
                 <a:cs typeface="Lato"/>
                 <a:sym typeface="Lato"/>
               </a:rPr>
-              <a:t>We encode the state of the logical qubit as shown above, except apply a Hadamard gate first to create an arbitrary state. This is because a phase flip applied to the 0 state yields the 0 state again so it would be a trivial error. We then detect for a phase flip error using the ancillary qubits (a phase flip in the binary basis is equivalent to a bit flip in the Hadamard basis). Again this error detection scheme assumes that errors only occur after encoding (in other words, the encoding is perfect) and that any error is a single phase flip on exactly one of the non-ancillary qubits. </a:t>
+              <a:t>We encode the state of the logical qubit as shown above, except </a:t>
+            </a:r>
+            <a:r>
+              <a:rPr b="1" lang="en">
+                <a:latin typeface="Lato"/>
+                <a:ea typeface="Lato"/>
+                <a:cs typeface="Lato"/>
+                <a:sym typeface="Lato"/>
+              </a:rPr>
+              <a:t>apply a Hadamard gate first to create an arbitrary state</a:t>
+            </a:r>
+            <a:r>
+              <a:rPr lang="en">
+                <a:latin typeface="Lato"/>
+                <a:ea typeface="Lato"/>
+                <a:cs typeface="Lato"/>
+                <a:sym typeface="Lato"/>
+              </a:rPr>
+              <a:t>. This is because a </a:t>
+            </a:r>
+            <a:r>
+              <a:rPr b="1" lang="en">
+                <a:latin typeface="Lato"/>
+                <a:ea typeface="Lato"/>
+                <a:cs typeface="Lato"/>
+                <a:sym typeface="Lato"/>
+              </a:rPr>
+              <a:t>phase flip applied to the 0 state yields the 0 state again</a:t>
+            </a:r>
+            <a:r>
+              <a:rPr lang="en">
+                <a:latin typeface="Lato"/>
+                <a:ea typeface="Lato"/>
+                <a:cs typeface="Lato"/>
+                <a:sym typeface="Lato"/>
+              </a:rPr>
+              <a:t> so it would be a trivial error. We then detect for a phase flip error using the ancillary qubits (a </a:t>
+            </a:r>
+            <a:r>
+              <a:rPr b="1" lang="en">
+                <a:latin typeface="Lato"/>
+                <a:ea typeface="Lato"/>
+                <a:cs typeface="Lato"/>
+                <a:sym typeface="Lato"/>
+              </a:rPr>
+              <a:t>phase flip in the binary basis is equivalent to a bit flip in the Hadamard basis</a:t>
+            </a:r>
+            <a:r>
+              <a:rPr lang="en">
+                <a:latin typeface="Lato"/>
+                <a:ea typeface="Lato"/>
+                <a:cs typeface="Lato"/>
+                <a:sym typeface="Lato"/>
+              </a:rPr>
+              <a:t>). Again this error detection scheme assumes that errors only occur after encoding (in other words, the encoding is perfect) and that any error is a single phase flip on exactly one of the non-ancillary qubits. </a:t>
             </a:r>
             <a:endParaRPr>
               <a:latin typeface="Lato"/>
@@ -3106,7 +3160,133 @@
                 <a:cs typeface="Lato"/>
                 <a:sym typeface="Lato"/>
               </a:rPr>
-              <a:t>Now in addition to detecting single bit flip errors, this circuit adds a set of gates that apply a corrective operation. Instead of changing to the Hadamard basis and then applying a bit flip (X gate) we just apply a phase flip in the binary basis (Z gate), so we can then use CNOT gates to correct the error. Based on which ancillary qubits were flipped, we theoretically know exactly on which qubit the error occured. The error correction process here is identical to the bit flip circuit, except we wrap each CNOT gate in Hadamard gates. This makes the gates behave like controlled Z gates.</a:t>
+              <a:t>Now in addition to detecting single bit flip errors, this circuit </a:t>
+            </a:r>
+            <a:r>
+              <a:rPr b="1" lang="en">
+                <a:latin typeface="Lato"/>
+                <a:ea typeface="Lato"/>
+                <a:cs typeface="Lato"/>
+                <a:sym typeface="Lato"/>
+              </a:rPr>
+              <a:t>adds a set of gates that apply a corrective operation</a:t>
+            </a:r>
+            <a:r>
+              <a:rPr lang="en">
+                <a:latin typeface="Lato"/>
+                <a:ea typeface="Lato"/>
+                <a:cs typeface="Lato"/>
+                <a:sym typeface="Lato"/>
+              </a:rPr>
+              <a:t>. Instead of changing to the Hadamard basis and then applying a bit flip (X gate) we </a:t>
+            </a:r>
+            <a:r>
+              <a:rPr b="1" lang="en">
+                <a:latin typeface="Lato"/>
+                <a:ea typeface="Lato"/>
+                <a:cs typeface="Lato"/>
+                <a:sym typeface="Lato"/>
+              </a:rPr>
+              <a:t>just apply a phase flip </a:t>
+            </a:r>
+            <a:r>
+              <a:rPr b="1" lang="en">
+                <a:latin typeface="Lato"/>
+                <a:ea typeface="Lato"/>
+                <a:cs typeface="Lato"/>
+                <a:sym typeface="Lato"/>
+              </a:rPr>
+              <a:t>(Z gate)</a:t>
+            </a:r>
+            <a:r>
+              <a:rPr b="1" lang="en">
+                <a:latin typeface="Lato"/>
+                <a:ea typeface="Lato"/>
+                <a:cs typeface="Lato"/>
+                <a:sym typeface="Lato"/>
+              </a:rPr>
+              <a:t> in the binary basis</a:t>
+            </a:r>
+            <a:r>
+              <a:rPr lang="en">
+                <a:latin typeface="Lato"/>
+                <a:ea typeface="Lato"/>
+                <a:cs typeface="Lato"/>
+                <a:sym typeface="Lato"/>
+              </a:rPr>
+              <a:t>, so we can </a:t>
+            </a:r>
+            <a:r>
+              <a:rPr b="1" lang="en">
+                <a:latin typeface="Lato"/>
+                <a:ea typeface="Lato"/>
+                <a:cs typeface="Lato"/>
+                <a:sym typeface="Lato"/>
+              </a:rPr>
+              <a:t>then use CNOT gates to correct the error</a:t>
+            </a:r>
+            <a:r>
+              <a:rPr lang="en">
+                <a:latin typeface="Lato"/>
+                <a:ea typeface="Lato"/>
+                <a:cs typeface="Lato"/>
+                <a:sym typeface="Lato"/>
+              </a:rPr>
+              <a:t>. Based on which ancillary qubits were flipped, we theoretically know exactly on which qubit the error occured. The </a:t>
+            </a:r>
+            <a:r>
+              <a:rPr b="1" lang="en">
+                <a:latin typeface="Lato"/>
+                <a:ea typeface="Lato"/>
+                <a:cs typeface="Lato"/>
+                <a:sym typeface="Lato"/>
+              </a:rPr>
+              <a:t>error correction process here is identical to the bit flip circuit</a:t>
+            </a:r>
+            <a:r>
+              <a:rPr lang="en">
+                <a:latin typeface="Lato"/>
+                <a:ea typeface="Lato"/>
+                <a:cs typeface="Lato"/>
+                <a:sym typeface="Lato"/>
+              </a:rPr>
+              <a:t>, except we </a:t>
+            </a:r>
+            <a:r>
+              <a:rPr b="1" lang="en">
+                <a:latin typeface="Lato"/>
+                <a:ea typeface="Lato"/>
+                <a:cs typeface="Lato"/>
+                <a:sym typeface="Lato"/>
+              </a:rPr>
+              <a:t>wrap each CNOT gate in Hadamard gates</a:t>
+            </a:r>
+            <a:r>
+              <a:rPr lang="en">
+                <a:latin typeface="Lato"/>
+                <a:ea typeface="Lato"/>
+                <a:cs typeface="Lato"/>
+                <a:sym typeface="Lato"/>
+              </a:rPr>
+              <a:t>. This makes the gates </a:t>
+            </a:r>
+            <a:r>
+              <a:rPr b="1" lang="en">
+                <a:latin typeface="Lato"/>
+                <a:ea typeface="Lato"/>
+                <a:cs typeface="Lato"/>
+                <a:sym typeface="Lato"/>
+              </a:rPr>
+              <a:t>behave like controlled Z gates</a:t>
+            </a:r>
+            <a:r>
+              <a:rPr lang="en">
+                <a:latin typeface="Lato"/>
+                <a:ea typeface="Lato"/>
+                <a:cs typeface="Lato"/>
+                <a:sym typeface="Lato"/>
+              </a:rPr>
+              <a:t>.</a:t>
             </a:r>
             <a:endParaRPr>
               <a:latin typeface="Lato"/>
@@ -11629,8 +11809,8 @@
         </p:nvSpPr>
         <p:spPr>
           <a:xfrm>
-            <a:off x="5103275" y="3354500"/>
-            <a:ext cx="3801300" cy="506100"/>
+            <a:off x="4681750" y="3354500"/>
+            <a:ext cx="4222800" cy="506100"/>
           </a:xfrm>
           <a:prstGeom prst="rect">
             <a:avLst/>
@@ -11652,10 +11832,20 @@
               <a:buNone/>
             </a:pPr>
             <a:r>
-              <a:rPr lang="en"/>
+              <a:rPr lang="en">
+                <a:latin typeface="Montserrat"/>
+                <a:ea typeface="Montserrat"/>
+                <a:cs typeface="Montserrat"/>
+                <a:sym typeface="Montserrat"/>
+              </a:rPr>
               <a:t>Philippe Noël, Alaisha Sharma, Nicolas Weninger</a:t>
             </a:r>
-            <a:endParaRPr/>
+            <a:endParaRPr>
+              <a:latin typeface="Montserrat"/>
+              <a:ea typeface="Montserrat"/>
+              <a:cs typeface="Montserrat"/>
+              <a:sym typeface="Montserrat"/>
+            </a:endParaRPr>
           </a:p>
         </p:txBody>
       </p:sp>
@@ -11669,8 +11859,8 @@
         </p:nvSpPr>
         <p:spPr>
           <a:xfrm>
-            <a:off x="6999725" y="3763950"/>
-            <a:ext cx="1750200" cy="620700"/>
+            <a:off x="6541900" y="3751450"/>
+            <a:ext cx="2283000" cy="620700"/>
           </a:xfrm>
           <a:prstGeom prst="rect">
             <a:avLst/>
@@ -11692,10 +11882,20 @@
               <a:buNone/>
             </a:pPr>
             <a:r>
-              <a:rPr lang="en"/>
+              <a:rPr lang="en">
+                <a:latin typeface="Montserrat"/>
+                <a:ea typeface="Montserrat"/>
+                <a:cs typeface="Montserrat"/>
+                <a:sym typeface="Montserrat"/>
+              </a:rPr>
               <a:t>ES 170 Final Project</a:t>
             </a:r>
-            <a:endParaRPr/>
+            <a:endParaRPr>
+              <a:latin typeface="Montserrat"/>
+              <a:ea typeface="Montserrat"/>
+              <a:cs typeface="Montserrat"/>
+              <a:sym typeface="Montserrat"/>
+            </a:endParaRPr>
           </a:p>
           <a:p>
             <a:pPr indent="0" lvl="0" marL="0" algn="r">
@@ -11710,7 +11910,12 @@
             <a:r>
               <a:t/>
             </a:r>
-            <a:endParaRPr/>
+            <a:endParaRPr>
+              <a:latin typeface="Montserrat"/>
+              <a:ea typeface="Montserrat"/>
+              <a:cs typeface="Montserrat"/>
+              <a:sym typeface="Montserrat"/>
+            </a:endParaRPr>
           </a:p>
           <a:p>
             <a:pPr indent="0" lvl="0" marL="0" algn="r">
@@ -11723,10 +11928,20 @@
               <a:buNone/>
             </a:pPr>
             <a:r>
-              <a:rPr lang="en"/>
+              <a:rPr lang="en">
+                <a:latin typeface="Montserrat"/>
+                <a:ea typeface="Montserrat"/>
+                <a:cs typeface="Montserrat"/>
+                <a:sym typeface="Montserrat"/>
+              </a:rPr>
               <a:t>10 May 2018</a:t>
             </a:r>
-            <a:endParaRPr/>
+            <a:endParaRPr>
+              <a:latin typeface="Montserrat"/>
+              <a:ea typeface="Montserrat"/>
+              <a:cs typeface="Montserrat"/>
+              <a:sym typeface="Montserrat"/>
+            </a:endParaRPr>
           </a:p>
           <a:p>
             <a:pPr indent="0" lvl="0" marL="0" rtl="0" algn="r">
@@ -11741,7 +11956,12 @@
             <a:r>
               <a:t/>
             </a:r>
-            <a:endParaRPr/>
+            <a:endParaRPr>
+              <a:latin typeface="Montserrat"/>
+              <a:ea typeface="Montserrat"/>
+              <a:cs typeface="Montserrat"/>
+              <a:sym typeface="Montserrat"/>
+            </a:endParaRPr>
           </a:p>
         </p:txBody>
       </p:sp>
@@ -12400,6 +12620,11 @@
               <a:spcAft>
                 <a:spcPts val="700"/>
               </a:spcAft>
+              <a:buClr>
+                <a:schemeClr val="lt1"/>
+              </a:buClr>
+              <a:buSzPts val="1800"/>
+              <a:buFont typeface="Montserrat"/>
               <a:buNone/>
             </a:pPr>
             <a:r>
@@ -13278,7 +13503,7 @@
         </p:nvSpPr>
         <p:spPr>
           <a:xfrm>
-            <a:off x="766625" y="1427025"/>
+            <a:off x="1197625" y="1427025"/>
             <a:ext cx="4688400" cy="3600300"/>
           </a:xfrm>
           <a:prstGeom prst="rect">
@@ -13291,169 +13516,283 @@
           </a:bodyPr>
           <a:lstStyle/>
           <a:p>
-            <a:pPr indent="-342900" lvl="0" marL="457200" rtl="0">
-              <a:spcBef>
-                <a:spcPts val="0"/>
-              </a:spcBef>
-              <a:spcAft>
-                <a:spcPts val="0"/>
-              </a:spcAft>
-              <a:buSzPts val="1800"/>
+            <a:pPr indent="-336550" lvl="0" marL="457200" rtl="0">
+              <a:spcBef>
+                <a:spcPts val="0"/>
+              </a:spcBef>
+              <a:spcAft>
+                <a:spcPts val="0"/>
+              </a:spcAft>
+              <a:buSzPts val="1700"/>
+              <a:buFont typeface="Montserrat"/>
               <a:buChar char="●"/>
             </a:pPr>
             <a:r>
-              <a:rPr lang="en" sz="1800"/>
+              <a:rPr lang="en" sz="1700">
+                <a:latin typeface="Montserrat"/>
+                <a:ea typeface="Montserrat"/>
+                <a:cs typeface="Montserrat"/>
+                <a:sym typeface="Montserrat"/>
+              </a:rPr>
               <a:t>General</a:t>
             </a:r>
             <a:r>
-              <a:rPr lang="en" sz="1800"/>
+              <a:rPr lang="en" sz="1700">
+                <a:latin typeface="Montserrat"/>
+                <a:ea typeface="Montserrat"/>
+                <a:cs typeface="Montserrat"/>
+                <a:sym typeface="Montserrat"/>
+              </a:rPr>
               <a:t> idea</a:t>
             </a:r>
-            <a:endParaRPr sz="1800"/>
+            <a:endParaRPr sz="1700">
+              <a:latin typeface="Montserrat"/>
+              <a:ea typeface="Montserrat"/>
+              <a:cs typeface="Montserrat"/>
+              <a:sym typeface="Montserrat"/>
+            </a:endParaRPr>
           </a:p>
           <a:p>
-            <a:pPr indent="-342900" lvl="1" marL="914400" rtl="0">
-              <a:spcBef>
-                <a:spcPts val="0"/>
-              </a:spcBef>
-              <a:spcAft>
-                <a:spcPts val="0"/>
-              </a:spcAft>
-              <a:buSzPts val="1800"/>
+            <a:pPr indent="-336550" lvl="1" marL="914400" rtl="0">
+              <a:spcBef>
+                <a:spcPts val="0"/>
+              </a:spcBef>
+              <a:spcAft>
+                <a:spcPts val="0"/>
+              </a:spcAft>
+              <a:buSzPts val="1700"/>
+              <a:buFont typeface="Montserrat"/>
               <a:buChar char="○"/>
             </a:pPr>
             <a:r>
-              <a:rPr lang="en" sz="1800"/>
+              <a:rPr lang="en" sz="1700">
+                <a:latin typeface="Montserrat"/>
+                <a:ea typeface="Montserrat"/>
+                <a:cs typeface="Montserrat"/>
+                <a:sym typeface="Montserrat"/>
+              </a:rPr>
               <a:t>Message = bit sequence</a:t>
             </a:r>
-            <a:endParaRPr sz="1800"/>
+            <a:endParaRPr sz="1700">
+              <a:latin typeface="Montserrat"/>
+              <a:ea typeface="Montserrat"/>
+              <a:cs typeface="Montserrat"/>
+              <a:sym typeface="Montserrat"/>
+            </a:endParaRPr>
           </a:p>
           <a:p>
-            <a:pPr indent="-342900" lvl="1" marL="914400" rtl="0">
-              <a:spcBef>
-                <a:spcPts val="0"/>
-              </a:spcBef>
-              <a:spcAft>
-                <a:spcPts val="0"/>
-              </a:spcAft>
-              <a:buSzPts val="1800"/>
+            <a:pPr indent="-336550" lvl="1" marL="914400" rtl="0">
+              <a:spcBef>
+                <a:spcPts val="0"/>
+              </a:spcBef>
+              <a:spcAft>
+                <a:spcPts val="0"/>
+              </a:spcAft>
+              <a:buSzPts val="1700"/>
+              <a:buFont typeface="Montserrat"/>
               <a:buChar char="○"/>
             </a:pPr>
             <a:r>
-              <a:rPr lang="en" sz="1800"/>
+              <a:rPr lang="en" sz="1700">
+                <a:latin typeface="Montserrat"/>
+                <a:ea typeface="Montserrat"/>
+                <a:cs typeface="Montserrat"/>
+                <a:sym typeface="Montserrat"/>
+              </a:rPr>
               <a:t>Encoding</a:t>
             </a:r>
-            <a:endParaRPr sz="1800"/>
+            <a:endParaRPr sz="1700">
+              <a:latin typeface="Montserrat"/>
+              <a:ea typeface="Montserrat"/>
+              <a:cs typeface="Montserrat"/>
+              <a:sym typeface="Montserrat"/>
+            </a:endParaRPr>
           </a:p>
           <a:p>
-            <a:pPr indent="-342900" lvl="1" marL="914400" rtl="0">
-              <a:spcBef>
-                <a:spcPts val="0"/>
-              </a:spcBef>
-              <a:spcAft>
-                <a:spcPts val="0"/>
-              </a:spcAft>
-              <a:buSzPts val="1800"/>
+            <a:pPr indent="-336550" lvl="1" marL="914400" rtl="0">
+              <a:spcBef>
+                <a:spcPts val="0"/>
+              </a:spcBef>
+              <a:spcAft>
+                <a:spcPts val="0"/>
+              </a:spcAft>
+              <a:buSzPts val="1700"/>
+              <a:buFont typeface="Montserrat"/>
               <a:buChar char="○"/>
             </a:pPr>
             <a:r>
-              <a:rPr lang="en" sz="1800"/>
+              <a:rPr lang="en" sz="1700">
+                <a:latin typeface="Montserrat"/>
+                <a:ea typeface="Montserrat"/>
+                <a:cs typeface="Montserrat"/>
+                <a:sym typeface="Montserrat"/>
+              </a:rPr>
               <a:t>Detection</a:t>
             </a:r>
-            <a:endParaRPr sz="1800"/>
+            <a:endParaRPr sz="1700">
+              <a:latin typeface="Montserrat"/>
+              <a:ea typeface="Montserrat"/>
+              <a:cs typeface="Montserrat"/>
+              <a:sym typeface="Montserrat"/>
+            </a:endParaRPr>
           </a:p>
           <a:p>
-            <a:pPr indent="-342900" lvl="1" marL="914400" rtl="0">
-              <a:spcBef>
-                <a:spcPts val="0"/>
-              </a:spcBef>
-              <a:spcAft>
-                <a:spcPts val="0"/>
-              </a:spcAft>
-              <a:buSzPts val="1800"/>
+            <a:pPr indent="-336550" lvl="1" marL="914400" rtl="0">
+              <a:spcBef>
+                <a:spcPts val="0"/>
+              </a:spcBef>
+              <a:spcAft>
+                <a:spcPts val="0"/>
+              </a:spcAft>
+              <a:buSzPts val="1700"/>
+              <a:buFont typeface="Montserrat"/>
               <a:buChar char="○"/>
             </a:pPr>
             <a:r>
-              <a:rPr lang="en" sz="1800"/>
+              <a:rPr lang="en" sz="1700">
+                <a:latin typeface="Montserrat"/>
+                <a:ea typeface="Montserrat"/>
+                <a:cs typeface="Montserrat"/>
+                <a:sym typeface="Montserrat"/>
+              </a:rPr>
               <a:t>Correction / recovery</a:t>
             </a:r>
-            <a:endParaRPr sz="1800"/>
+            <a:endParaRPr sz="1700">
+              <a:latin typeface="Montserrat"/>
+              <a:ea typeface="Montserrat"/>
+              <a:cs typeface="Montserrat"/>
+              <a:sym typeface="Montserrat"/>
+            </a:endParaRPr>
           </a:p>
           <a:p>
-            <a:pPr indent="-342900" lvl="0" marL="457200" rtl="0">
-              <a:spcBef>
-                <a:spcPts val="0"/>
-              </a:spcBef>
-              <a:spcAft>
-                <a:spcPts val="0"/>
-              </a:spcAft>
-              <a:buSzPts val="1800"/>
+            <a:pPr indent="-336550" lvl="0" marL="457200" rtl="0">
+              <a:spcBef>
+                <a:spcPts val="0"/>
+              </a:spcBef>
+              <a:spcAft>
+                <a:spcPts val="0"/>
+              </a:spcAft>
+              <a:buSzPts val="1700"/>
+              <a:buFont typeface="Montserrat"/>
               <a:buChar char="●"/>
             </a:pPr>
             <a:r>
-              <a:rPr lang="en" sz="1800"/>
+              <a:rPr lang="en" sz="1700">
+                <a:latin typeface="Montserrat"/>
+                <a:ea typeface="Montserrat"/>
+                <a:cs typeface="Montserrat"/>
+                <a:sym typeface="Montserrat"/>
+              </a:rPr>
               <a:t>Binary symmetric channel</a:t>
             </a:r>
-            <a:endParaRPr sz="1800"/>
+            <a:endParaRPr sz="1700">
+              <a:latin typeface="Montserrat"/>
+              <a:ea typeface="Montserrat"/>
+              <a:cs typeface="Montserrat"/>
+              <a:sym typeface="Montserrat"/>
+            </a:endParaRPr>
           </a:p>
           <a:p>
-            <a:pPr indent="-342900" lvl="1" marL="914400" rtl="0">
-              <a:spcBef>
-                <a:spcPts val="0"/>
-              </a:spcBef>
-              <a:spcAft>
-                <a:spcPts val="0"/>
-              </a:spcAft>
-              <a:buSzPts val="1800"/>
+            <a:pPr indent="-336550" lvl="1" marL="914400" rtl="0">
+              <a:spcBef>
+                <a:spcPts val="0"/>
+              </a:spcBef>
+              <a:spcAft>
+                <a:spcPts val="0"/>
+              </a:spcAft>
+              <a:buSzPts val="1700"/>
+              <a:buFont typeface="Montserrat"/>
               <a:buChar char="○"/>
             </a:pPr>
             <a:r>
-              <a:rPr lang="en" sz="1800"/>
+              <a:rPr lang="en" sz="1700">
+                <a:latin typeface="Montserrat"/>
+                <a:ea typeface="Montserrat"/>
+                <a:cs typeface="Montserrat"/>
+                <a:sym typeface="Montserrat"/>
+              </a:rPr>
               <a:t>0 → 000</a:t>
             </a:r>
-            <a:endParaRPr sz="1800"/>
+            <a:endParaRPr sz="1700">
+              <a:latin typeface="Montserrat"/>
+              <a:ea typeface="Montserrat"/>
+              <a:cs typeface="Montserrat"/>
+              <a:sym typeface="Montserrat"/>
+            </a:endParaRPr>
           </a:p>
           <a:p>
-            <a:pPr indent="-342900" lvl="1" marL="914400" rtl="0">
-              <a:spcBef>
-                <a:spcPts val="0"/>
-              </a:spcBef>
-              <a:spcAft>
-                <a:spcPts val="0"/>
-              </a:spcAft>
-              <a:buSzPts val="1800"/>
+            <a:pPr indent="-336550" lvl="1" marL="914400" rtl="0">
+              <a:spcBef>
+                <a:spcPts val="0"/>
+              </a:spcBef>
+              <a:spcAft>
+                <a:spcPts val="0"/>
+              </a:spcAft>
+              <a:buSzPts val="1700"/>
+              <a:buFont typeface="Montserrat"/>
               <a:buChar char="○"/>
             </a:pPr>
             <a:r>
-              <a:rPr lang="en" sz="1800"/>
+              <a:rPr lang="en" sz="1700">
+                <a:latin typeface="Montserrat"/>
+                <a:ea typeface="Montserrat"/>
+                <a:cs typeface="Montserrat"/>
+                <a:sym typeface="Montserrat"/>
+              </a:rPr>
               <a:t>1 → 111</a:t>
             </a:r>
-            <a:endParaRPr sz="1800"/>
+            <a:endParaRPr sz="1700">
+              <a:latin typeface="Montserrat"/>
+              <a:ea typeface="Montserrat"/>
+              <a:cs typeface="Montserrat"/>
+              <a:sym typeface="Montserrat"/>
+            </a:endParaRPr>
           </a:p>
           <a:p>
-            <a:pPr indent="-342900" lvl="1" marL="914400">
-              <a:spcBef>
-                <a:spcPts val="0"/>
-              </a:spcBef>
-              <a:spcAft>
-                <a:spcPts val="0"/>
-              </a:spcAft>
-              <a:buSzPts val="1800"/>
+            <a:pPr indent="-336550" lvl="1" marL="914400">
+              <a:spcBef>
+                <a:spcPts val="0"/>
+              </a:spcBef>
+              <a:spcAft>
+                <a:spcPts val="0"/>
+              </a:spcAft>
+              <a:buSzPts val="1700"/>
+              <a:buFont typeface="Montserrat"/>
               <a:buChar char="○"/>
             </a:pPr>
             <a:r>
-              <a:rPr lang="en" sz="1800"/>
+              <a:rPr lang="en" sz="1700">
+                <a:latin typeface="Montserrat"/>
+                <a:ea typeface="Montserrat"/>
+                <a:cs typeface="Montserrat"/>
+                <a:sym typeface="Montserrat"/>
+              </a:rPr>
               <a:t>Small error probability </a:t>
             </a:r>
             <a:r>
-              <a:rPr i="1" lang="en" sz="1800"/>
+              <a:rPr i="1" lang="en" sz="1700">
+                <a:latin typeface="Montserrat"/>
+                <a:ea typeface="Montserrat"/>
+                <a:cs typeface="Montserrat"/>
+                <a:sym typeface="Montserrat"/>
+              </a:rPr>
               <a:t>p</a:t>
             </a:r>
             <a:r>
-              <a:rPr lang="en" sz="1800"/>
+              <a:rPr lang="en" sz="1700">
+                <a:latin typeface="Montserrat"/>
+                <a:ea typeface="Montserrat"/>
+                <a:cs typeface="Montserrat"/>
+                <a:sym typeface="Montserrat"/>
+              </a:rPr>
               <a:t> </a:t>
             </a:r>
-            <a:endParaRPr sz="1800"/>
+            <a:endParaRPr sz="1700">
+              <a:latin typeface="Montserrat"/>
+              <a:ea typeface="Montserrat"/>
+              <a:cs typeface="Montserrat"/>
+              <a:sym typeface="Montserrat"/>
+            </a:endParaRPr>
           </a:p>
         </p:txBody>
       </p:sp>
@@ -13473,7 +13812,7 @@
         </p:blipFill>
         <p:spPr>
           <a:xfrm>
-            <a:off x="5341850" y="1976325"/>
+            <a:off x="5379300" y="1938875"/>
             <a:ext cx="3156850" cy="2068750"/>
           </a:xfrm>
           <a:prstGeom prst="rect">
@@ -13560,7 +13899,7 @@
         </p:nvSpPr>
         <p:spPr>
           <a:xfrm>
-            <a:off x="1297500" y="1734375"/>
+            <a:off x="1297500" y="1555825"/>
             <a:ext cx="3458400" cy="3213900"/>
           </a:xfrm>
           <a:prstGeom prst="rect">
@@ -13573,44 +13912,64 @@
           </a:bodyPr>
           <a:lstStyle/>
           <a:p>
+            <a:pPr indent="0" lvl="0" marL="0" rtl="0">
+              <a:lnSpc>
+                <a:spcPct val="115000"/>
+              </a:lnSpc>
+              <a:spcBef>
+                <a:spcPts val="0"/>
+              </a:spcBef>
+              <a:spcAft>
+                <a:spcPts val="0"/>
+              </a:spcAft>
+              <a:buNone/>
+            </a:pPr>
+            <a:r>
+              <a:rPr b="1" lang="en" sz="1800">
+                <a:latin typeface="Montserrat"/>
+                <a:ea typeface="Montserrat"/>
+                <a:cs typeface="Montserrat"/>
+                <a:sym typeface="Montserrat"/>
+              </a:rPr>
+              <a:t>Ground Rules</a:t>
+            </a:r>
+            <a:endParaRPr b="1" sz="1800">
+              <a:latin typeface="Montserrat"/>
+              <a:ea typeface="Montserrat"/>
+              <a:cs typeface="Montserrat"/>
+              <a:sym typeface="Montserrat"/>
+            </a:endParaRPr>
+          </a:p>
+          <a:p>
             <a:pPr indent="-342900" lvl="0" marL="457200" rtl="0">
               <a:lnSpc>
-                <a:spcPct val="200000"/>
+                <a:spcPct val="150000"/>
               </a:lnSpc>
               <a:spcBef>
-                <a:spcPts val="0"/>
+                <a:spcPts val="1600"/>
               </a:spcBef>
               <a:spcAft>
                 <a:spcPts val="0"/>
               </a:spcAft>
               <a:buSzPts val="1800"/>
+              <a:buFont typeface="Montserrat"/>
               <a:buAutoNum type="arabicPeriod"/>
             </a:pPr>
             <a:r>
-              <a:rPr lang="en" sz="1800"/>
+              <a:rPr lang="en" sz="1800">
+                <a:latin typeface="Montserrat"/>
+                <a:ea typeface="Montserrat"/>
+                <a:cs typeface="Montserrat"/>
+                <a:sym typeface="Montserrat"/>
+              </a:rPr>
               <a:t>No cloning of states</a:t>
             </a:r>
-            <a:endParaRPr sz="1800"/>
-          </a:p>
-          <a:p>
-            <a:pPr indent="-342900" lvl="0" marL="457200" marR="0" rtl="0" algn="l">
-              <a:lnSpc>
-                <a:spcPct val="200000"/>
-              </a:lnSpc>
-              <a:spcBef>
-                <a:spcPts val="0"/>
-              </a:spcBef>
-              <a:spcAft>
-                <a:spcPts val="0"/>
-              </a:spcAft>
-              <a:buSzPts val="1800"/>
-              <a:buAutoNum type="arabicPeriod"/>
-            </a:pPr>
-            <a:r>
-              <a:rPr lang="en" sz="1800"/>
-              <a:t>Errors are continuous	</a:t>
-            </a:r>
-            <a:endParaRPr sz="1800"/>
+            <a:endParaRPr sz="1800">
+              <a:latin typeface="Montserrat"/>
+              <a:ea typeface="Montserrat"/>
+              <a:cs typeface="Montserrat"/>
+              <a:sym typeface="Montserrat"/>
+            </a:endParaRPr>
           </a:p>
           <a:p>
             <a:pPr indent="-342900" lvl="0" marL="457200" marR="0" rtl="0" algn="l">
@@ -13624,13 +13983,55 @@
                 <a:spcPts val="0"/>
               </a:spcAft>
               <a:buSzPts val="1800"/>
+              <a:buFont typeface="Montserrat"/>
               <a:buAutoNum type="arabicPeriod"/>
             </a:pPr>
             <a:r>
-              <a:rPr lang="en" sz="1800"/>
+              <a:rPr lang="en" sz="1800">
+                <a:latin typeface="Montserrat"/>
+                <a:ea typeface="Montserrat"/>
+                <a:cs typeface="Montserrat"/>
+                <a:sym typeface="Montserrat"/>
+              </a:rPr>
+              <a:t>Errors are continuous	</a:t>
+            </a:r>
+            <a:endParaRPr sz="1800">
+              <a:latin typeface="Montserrat"/>
+              <a:ea typeface="Montserrat"/>
+              <a:cs typeface="Montserrat"/>
+              <a:sym typeface="Montserrat"/>
+            </a:endParaRPr>
+          </a:p>
+          <a:p>
+            <a:pPr indent="-342900" lvl="0" marL="457200" marR="0" rtl="0" algn="l">
+              <a:lnSpc>
+                <a:spcPct val="150000"/>
+              </a:lnSpc>
+              <a:spcBef>
+                <a:spcPts val="0"/>
+              </a:spcBef>
+              <a:spcAft>
+                <a:spcPts val="0"/>
+              </a:spcAft>
+              <a:buSzPts val="1800"/>
+              <a:buFont typeface="Montserrat"/>
+              <a:buAutoNum type="arabicPeriod"/>
+            </a:pPr>
+            <a:r>
+              <a:rPr lang="en" sz="1800">
+                <a:latin typeface="Montserrat"/>
+                <a:ea typeface="Montserrat"/>
+                <a:cs typeface="Montserrat"/>
+                <a:sym typeface="Montserrat"/>
+              </a:rPr>
               <a:t>Measurement destroys information</a:t>
             </a:r>
-            <a:endParaRPr sz="1800"/>
+            <a:endParaRPr sz="1800">
+              <a:latin typeface="Montserrat"/>
+              <a:ea typeface="Montserrat"/>
+              <a:cs typeface="Montserrat"/>
+              <a:sym typeface="Montserrat"/>
+            </a:endParaRPr>
           </a:p>
         </p:txBody>
       </p:sp>
@@ -13650,7 +14051,7 @@
         </p:blipFill>
         <p:spPr>
           <a:xfrm>
-            <a:off x="5118700" y="1555825"/>
+            <a:off x="5239450" y="2030225"/>
             <a:ext cx="3096950" cy="2625800"/>
           </a:xfrm>
           <a:prstGeom prst="rect">
@@ -13834,7 +14235,7 @@
           </a:bodyPr>
           <a:lstStyle/>
           <a:p>
-            <a:pPr indent="-330200" lvl="0" marL="457200" rtl="0">
+            <a:pPr indent="-317500" lvl="0" marL="457200" rtl="0">
               <a:lnSpc>
                 <a:spcPct val="150000"/>
               </a:lnSpc>
@@ -13844,17 +14245,28 @@
               <a:spcAft>
                 <a:spcPts val="0"/>
               </a:spcAft>
-              <a:buSzPts val="1600"/>
+              <a:buSzPts val="1400"/>
+              <a:buFont typeface="Montserrat"/>
               <a:buChar char="●"/>
             </a:pPr>
             <a:r>
-              <a:rPr lang="en" sz="1600"/>
+              <a:rPr lang="en" sz="1400">
+                <a:latin typeface="Montserrat"/>
+                <a:ea typeface="Montserrat"/>
+                <a:cs typeface="Montserrat"/>
+                <a:sym typeface="Montserrat"/>
+              </a:rPr>
               <a:t>Single “logical” qubit mapped to three qubits</a:t>
             </a:r>
-            <a:endParaRPr sz="1600"/>
+            <a:endParaRPr sz="1400">
+              <a:latin typeface="Montserrat"/>
+              <a:ea typeface="Montserrat"/>
+              <a:cs typeface="Montserrat"/>
+              <a:sym typeface="Montserrat"/>
+            </a:endParaRPr>
           </a:p>
           <a:p>
-            <a:pPr indent="-330200" lvl="0" marL="457200" marR="0" rtl="0" algn="l">
+            <a:pPr indent="-317500" lvl="0" marL="457200" marR="0" rtl="0" algn="l">
               <a:lnSpc>
                 <a:spcPct val="150000"/>
               </a:lnSpc>
@@ -13867,18 +14279,28 @@
               <a:buClr>
                 <a:schemeClr val="lt1"/>
               </a:buClr>
-              <a:buSzPts val="1600"/>
-              <a:buFont typeface="Lato"/>
+              <a:buSzPts val="1400"/>
+              <a:buFont typeface="Montserrat"/>
               <a:buChar char="●"/>
             </a:pPr>
             <a:r>
-              <a:rPr lang="en" sz="1600"/>
+              <a:rPr lang="en" sz="1400">
+                <a:latin typeface="Montserrat"/>
+                <a:ea typeface="Montserrat"/>
+                <a:cs typeface="Montserrat"/>
+                <a:sym typeface="Montserrat"/>
+              </a:rPr>
               <a:t>Quantum state is preserved </a:t>
             </a:r>
-            <a:endParaRPr sz="1600"/>
+            <a:endParaRPr sz="1400">
+              <a:latin typeface="Montserrat"/>
+              <a:ea typeface="Montserrat"/>
+              <a:cs typeface="Montserrat"/>
+              <a:sym typeface="Montserrat"/>
+            </a:endParaRPr>
           </a:p>
           <a:p>
-            <a:pPr indent="-330200" lvl="0" marL="457200" marR="0" rtl="0" algn="l">
+            <a:pPr indent="-317500" lvl="0" marL="457200" marR="0" rtl="0" algn="l">
               <a:lnSpc>
                 <a:spcPct val="150000"/>
               </a:lnSpc>
@@ -13891,15 +14313,25 @@
               <a:buClr>
                 <a:schemeClr val="lt1"/>
               </a:buClr>
-              <a:buSzPts val="1600"/>
-              <a:buFont typeface="Lato"/>
+              <a:buSzPts val="1400"/>
+              <a:buFont typeface="Montserrat"/>
               <a:buChar char="●"/>
             </a:pPr>
             <a:r>
-              <a:rPr lang="en" sz="1600"/>
+              <a:rPr lang="en" sz="1400">
+                <a:latin typeface="Montserrat"/>
+                <a:ea typeface="Montserrat"/>
+                <a:cs typeface="Montserrat"/>
+                <a:sym typeface="Montserrat"/>
+              </a:rPr>
               <a:t>Redundancy introduced via duplication not repetition</a:t>
             </a:r>
-            <a:endParaRPr sz="1600"/>
+            <a:endParaRPr sz="1400">
+              <a:latin typeface="Montserrat"/>
+              <a:ea typeface="Montserrat"/>
+              <a:cs typeface="Montserrat"/>
+              <a:sym typeface="Montserrat"/>
+            </a:endParaRPr>
           </a:p>
           <a:p>
             <a:pPr indent="0" lvl="0" marL="0" marR="0" rtl="0" algn="l">
@@ -13917,7 +14349,12 @@
             <a:r>
               <a:t/>
             </a:r>
-            <a:endParaRPr sz="1600"/>
+            <a:endParaRPr sz="1400">
+              <a:latin typeface="Montserrat"/>
+              <a:ea typeface="Montserrat"/>
+              <a:cs typeface="Montserrat"/>
+              <a:sym typeface="Montserrat"/>
+            </a:endParaRPr>
           </a:p>
         </p:txBody>
       </p:sp>
@@ -14243,7 +14680,7 @@
         </p:blipFill>
         <p:spPr>
           <a:xfrm>
-            <a:off x="887275" y="1542225"/>
+            <a:off x="1459800" y="1411675"/>
             <a:ext cx="2899200" cy="2943425"/>
           </a:xfrm>
           <a:prstGeom prst="rect">
@@ -14261,18 +14698,17 @@
           <p:cNvPicPr preferRelativeResize="0"/>
           <p:nvPr/>
         </p:nvPicPr>
-        <p:blipFill>
+        <p:blipFill rotWithShape="1">
           <a:blip r:embed="rId4">
             <a:alphaModFix/>
           </a:blip>
-          <a:stretch>
-            <a:fillRect/>
-          </a:stretch>
+          <a:srcRect b="0" l="0" r="49382" t="0"/>
+          <a:stretch/>
         </p:blipFill>
         <p:spPr>
           <a:xfrm>
-            <a:off x="4059975" y="1542226"/>
-            <a:ext cx="4685337" cy="2943425"/>
+            <a:off x="5106650" y="1089700"/>
+            <a:ext cx="2990949" cy="3712225"/>
           </a:xfrm>
           <a:prstGeom prst="rect">
             <a:avLst/>
@@ -14478,6 +14914,285 @@
 </file>
 
 <file path=ppt/theme/theme1.xml><?xml version="1.0" encoding="utf-8"?>
+<a:theme xmlns:a="http://schemas.openxmlformats.org/drawingml/2006/main" xmlns:r="http://schemas.openxmlformats.org/officeDocument/2006/relationships" name="Focus">
+  <a:themeElements>
+    <a:clrScheme name="Focus">
+      <a:dk1>
+        <a:srgbClr val="1B212C"/>
+      </a:dk1>
+      <a:lt1>
+        <a:srgbClr val="FFFFFF"/>
+      </a:lt1>
+      <a:dk2>
+        <a:srgbClr val="D9D9D9"/>
+      </a:dk2>
+      <a:lt2>
+        <a:srgbClr val="82C7A5"/>
+      </a:lt2>
+      <a:accent1>
+        <a:srgbClr val="0145AC"/>
+      </a:accent1>
+      <a:accent2>
+        <a:srgbClr val="EECE1A"/>
+      </a:accent2>
+      <a:accent3>
+        <a:srgbClr val="4E5567"/>
+      </a:accent3>
+      <a:accent4>
+        <a:srgbClr val="F4D6AD"/>
+      </a:accent4>
+      <a:accent5>
+        <a:srgbClr val="7890CD"/>
+      </a:accent5>
+      <a:accent6>
+        <a:srgbClr val="F15E22"/>
+      </a:accent6>
+      <a:hlink>
+        <a:srgbClr val="7890CD"/>
+      </a:hlink>
+      <a:folHlink>
+        <a:srgbClr val="7890CD"/>
+      </a:folHlink>
+    </a:clrScheme>
+    <a:fontScheme name="Office">
+      <a:majorFont>
+        <a:latin typeface="Arial"/>
+        <a:ea typeface=""/>
+        <a:cs typeface=""/>
+        <a:font script="Jpan" typeface="ＭＳ Ｐゴシック"/>
+        <a:font script="Hang" typeface="맑은 고딕"/>
+        <a:font script="Hans" typeface="宋体"/>
+        <a:font script="Hant" typeface="新細明體"/>
+        <a:font script="Arab" typeface="Times New Roman"/>
+        <a:font script="Hebr" typeface="Times New Roman"/>
+        <a:font script="Thai" typeface="Angsana New"/>
+        <a:font script="Ethi" typeface="Nyala"/>
+        <a:font script="Beng" typeface="Vrinda"/>
+        <a:font script="Gujr" typeface="Shruti"/>
+        <a:font script="Khmr" typeface="MoolBoran"/>
+        <a:font script="Knda" typeface="Tunga"/>
+        <a:font script="Guru" typeface="Raavi"/>
+        <a:font script="Cans" typeface="Euphemia"/>
+        <a:font script="Cher" typeface="Plantagenet Cherokee"/>
+        <a:font script="Yiii" typeface="Microsoft Yi Baiti"/>
+        <a:font script="Tibt" typeface="Microsoft Himalaya"/>
+        <a:font script="Thaa" typeface="MV Boli"/>
+        <a:font script="Deva" typeface="Mangal"/>
+        <a:font script="Telu" typeface="Gautami"/>
+        <a:font script="Taml" typeface="Latha"/>
+        <a:font script="Syrc" typeface="Estrangelo Edessa"/>
+        <a:font script="Orya" typeface="Kalinga"/>
+        <a:font script="Mlym" typeface="Kartika"/>
+        <a:font script="Laoo" typeface="DokChampa"/>
+        <a:font script="Sinh" typeface="Iskoola Pota"/>
+        <a:font script="Mong" typeface="Mongolian Baiti"/>
+        <a:font script="Viet" typeface="Times New Roman"/>
+        <a:font script="Uigh" typeface="Microsoft Uighur"/>
+        <a:font script="Geor" typeface="Sylfaen"/>
+      </a:majorFont>
+      <a:minorFont>
+        <a:latin typeface="Arial"/>
+        <a:ea typeface=""/>
+        <a:cs typeface=""/>
+        <a:font script="Jpan" typeface="ＭＳ Ｐゴシック"/>
+        <a:font script="Hang" typeface="맑은 고딕"/>
+        <a:font script="Hans" typeface="宋体"/>
+        <a:font script="Hant" typeface="新細明體"/>
+        <a:font script="Arab" typeface="Arial"/>
+        <a:font script="Hebr" typeface="Arial"/>
+        <a:font script="Thai" typeface="Cordia New"/>
+        <a:font script="Ethi" typeface="Nyala"/>
+        <a:font script="Beng" typeface="Vrinda"/>
+        <a:font script="Gujr" typeface="Shruti"/>
+        <a:font script="Khmr" typeface="DaunPenh"/>
+        <a:font script="Knda" typeface="Tunga"/>
+        <a:font script="Guru" typeface="Raavi"/>
+        <a:font script="Cans" typeface="Euphemia"/>
+        <a:font script="Cher" typeface="Plantagenet Cherokee"/>
+        <a:font script="Yiii" typeface="Microsoft Yi Baiti"/>
+        <a:font script="Tibt" typeface="Microsoft Himalaya"/>
+        <a:font script="Thaa" typeface="MV Boli"/>
+        <a:font script="Deva" typeface="Mangal"/>
+        <a:font script="Telu" typeface="Gautami"/>
+        <a:font script="Taml" typeface="Latha"/>
+        <a:font script="Syrc" typeface="Estrangelo Edessa"/>
+        <a:font script="Orya" typeface="Kalinga"/>
+        <a:font script="Mlym" typeface="Kartika"/>
+        <a:font script="Laoo" typeface="DokChampa"/>
+        <a:font script="Sinh" typeface="Iskoola Pota"/>
+        <a:font script="Mong" typeface="Mongolian Baiti"/>
+        <a:font script="Viet" typeface="Arial"/>
+        <a:font script="Uigh" typeface="Microsoft Uighur"/>
+        <a:font script="Geor" typeface="Sylfaen"/>
+      </a:minorFont>
+    </a:fontScheme>
+    <a:fmtScheme name="Office">
+      <a:fillStyleLst>
+        <a:solidFill>
+          <a:schemeClr val="phClr"/>
+        </a:solidFill>
+        <a:gradFill rotWithShape="1">
+          <a:gsLst>
+            <a:gs pos="0">
+              <a:schemeClr val="phClr">
+                <a:tint val="50000"/>
+                <a:satMod val="300000"/>
+              </a:schemeClr>
+            </a:gs>
+            <a:gs pos="35000">
+              <a:schemeClr val="phClr">
+                <a:tint val="37000"/>
+                <a:satMod val="300000"/>
+              </a:schemeClr>
+            </a:gs>
+            <a:gs pos="100000">
+              <a:schemeClr val="phClr">
+                <a:tint val="15000"/>
+                <a:satMod val="350000"/>
+              </a:schemeClr>
+            </a:gs>
+          </a:gsLst>
+          <a:lin ang="16200000" scaled="1"/>
+        </a:gradFill>
+        <a:gradFill rotWithShape="1">
+          <a:gsLst>
+            <a:gs pos="0">
+              <a:schemeClr val="phClr">
+                <a:tint val="100000"/>
+                <a:shade val="100000"/>
+                <a:satMod val="130000"/>
+              </a:schemeClr>
+            </a:gs>
+            <a:gs pos="100000">
+              <a:schemeClr val="phClr">
+                <a:tint val="50000"/>
+                <a:shade val="100000"/>
+                <a:satMod val="350000"/>
+              </a:schemeClr>
+            </a:gs>
+          </a:gsLst>
+          <a:lin ang="16200000" scaled="0"/>
+        </a:gradFill>
+      </a:fillStyleLst>
+      <a:lnStyleLst>
+        <a:ln w="9525" cap="flat" cmpd="sng" algn="ctr">
+          <a:solidFill>
+            <a:schemeClr val="phClr">
+              <a:shade val="95000"/>
+              <a:satMod val="105000"/>
+            </a:schemeClr>
+          </a:solidFill>
+          <a:prstDash val="solid"/>
+        </a:ln>
+        <a:ln w="25400" cap="flat" cmpd="sng" algn="ctr">
+          <a:solidFill>
+            <a:schemeClr val="phClr"/>
+          </a:solidFill>
+          <a:prstDash val="solid"/>
+        </a:ln>
+        <a:ln w="38100" cap="flat" cmpd="sng" algn="ctr">
+          <a:solidFill>
+            <a:schemeClr val="phClr"/>
+          </a:solidFill>
+          <a:prstDash val="solid"/>
+        </a:ln>
+      </a:lnStyleLst>
+      <a:effectStyleLst>
+        <a:effectStyle>
+          <a:effectLst>
+            <a:outerShdw blurRad="40000" dist="20000" dir="5400000" rotWithShape="0">
+              <a:srgbClr val="000000">
+                <a:alpha val="38000"/>
+              </a:srgbClr>
+            </a:outerShdw>
+          </a:effectLst>
+        </a:effectStyle>
+        <a:effectStyle>
+          <a:effectLst>
+            <a:outerShdw blurRad="40000" dist="23000" dir="5400000" rotWithShape="0">
+              <a:srgbClr val="000000">
+                <a:alpha val="35000"/>
+              </a:srgbClr>
+            </a:outerShdw>
+          </a:effectLst>
+        </a:effectStyle>
+        <a:effectStyle>
+          <a:effectLst>
+            <a:outerShdw blurRad="40000" dist="23000" dir="5400000" rotWithShape="0">
+              <a:srgbClr val="000000">
+                <a:alpha val="35000"/>
+              </a:srgbClr>
+            </a:outerShdw>
+          </a:effectLst>
+          <a:scene3d>
+            <a:camera prst="orthographicFront">
+              <a:rot lat="0" lon="0" rev="0"/>
+            </a:camera>
+            <a:lightRig rig="threePt" dir="t">
+              <a:rot lat="0" lon="0" rev="1200000"/>
+            </a:lightRig>
+          </a:scene3d>
+          <a:sp3d>
+            <a:bevelT w="63500" h="25400"/>
+          </a:sp3d>
+        </a:effectStyle>
+      </a:effectStyleLst>
+      <a:bgFillStyleLst>
+        <a:solidFill>
+          <a:schemeClr val="phClr"/>
+        </a:solidFill>
+        <a:gradFill rotWithShape="1">
+          <a:gsLst>
+            <a:gs pos="0">
+              <a:schemeClr val="phClr">
+                <a:tint val="40000"/>
+                <a:satMod val="350000"/>
+              </a:schemeClr>
+            </a:gs>
+            <a:gs pos="40000">
+              <a:schemeClr val="phClr">
+                <a:tint val="45000"/>
+                <a:shade val="99000"/>
+                <a:satMod val="350000"/>
+              </a:schemeClr>
+            </a:gs>
+            <a:gs pos="100000">
+              <a:schemeClr val="phClr">
+                <a:shade val="20000"/>
+                <a:satMod val="255000"/>
+              </a:schemeClr>
+            </a:gs>
+          </a:gsLst>
+          <a:path path="circle">
+            <a:fillToRect l="50000" t="-80000" r="50000" b="180000"/>
+          </a:path>
+        </a:gradFill>
+        <a:gradFill rotWithShape="1">
+          <a:gsLst>
+            <a:gs pos="0">
+              <a:schemeClr val="phClr">
+                <a:tint val="80000"/>
+                <a:satMod val="300000"/>
+              </a:schemeClr>
+            </a:gs>
+            <a:gs pos="100000">
+              <a:schemeClr val="phClr">
+                <a:shade val="30000"/>
+                <a:satMod val="200000"/>
+              </a:schemeClr>
+            </a:gs>
+          </a:gsLst>
+          <a:path path="circle">
+            <a:fillToRect l="50000" t="50000" r="50000" b="50000"/>
+          </a:path>
+        </a:gradFill>
+      </a:bgFillStyleLst>
+    </a:fmtScheme>
+  </a:themeElements>
+</a:theme>
+</file>
+
+<file path=ppt/theme/theme2.xml><?xml version="1.0" encoding="utf-8"?>
 <a:theme xmlns:a="http://schemas.openxmlformats.org/drawingml/2006/main" xmlns:r="http://schemas.openxmlformats.org/officeDocument/2006/relationships">
   <a:themeElements>
     <a:clrScheme name="Default">
@@ -14754,283 +15469,4 @@
     </a:fmtScheme>
   </a:themeElements>
 </a:theme>
-</file>
-
-<file path=ppt/theme/theme2.xml><?xml version="1.0" encoding="utf-8"?>
-<a:theme xmlns:a="http://schemas.openxmlformats.org/drawingml/2006/main" xmlns:r="http://schemas.openxmlformats.org/officeDocument/2006/relationships" name="Focus">
-  <a:themeElements>
-    <a:clrScheme name="Focus">
-      <a:dk1>
-        <a:srgbClr val="1B212C"/>
-      </a:dk1>
-      <a:lt1>
-        <a:srgbClr val="FFFFFF"/>
-      </a:lt1>
-      <a:dk2>
-        <a:srgbClr val="D9D9D9"/>
-      </a:dk2>
-      <a:lt2>
-        <a:srgbClr val="82C7A5"/>
-      </a:lt2>
-      <a:accent1>
-        <a:srgbClr val="0145AC"/>
-      </a:accent1>
-      <a:accent2>
-        <a:srgbClr val="EECE1A"/>
-      </a:accent2>
-      <a:accent3>
-        <a:srgbClr val="4E5567"/>
-      </a:accent3>
-      <a:accent4>
-        <a:srgbClr val="F4D6AD"/>
-      </a:accent4>
-      <a:accent5>
-        <a:srgbClr val="7890CD"/>
-      </a:accent5>
-      <a:accent6>
-        <a:srgbClr val="F15E22"/>
-      </a:accent6>
-      <a:hlink>
-        <a:srgbClr val="7890CD"/>
-      </a:hlink>
-      <a:folHlink>
-        <a:srgbClr val="7890CD"/>
-      </a:folHlink>
-    </a:clrScheme>
-    <a:fontScheme name="Office">
-      <a:majorFont>
-        <a:latin typeface="Arial"/>
-        <a:ea typeface=""/>
-        <a:cs typeface=""/>
-        <a:font script="Jpan" typeface="ＭＳ Ｐゴシック"/>
-        <a:font script="Hang" typeface="맑은 고딕"/>
-        <a:font script="Hans" typeface="宋体"/>
-        <a:font script="Hant" typeface="新細明體"/>
-        <a:font script="Arab" typeface="Times New Roman"/>
-        <a:font script="Hebr" typeface="Times New Roman"/>
-        <a:font script="Thai" typeface="Angsana New"/>
-        <a:font script="Ethi" typeface="Nyala"/>
-        <a:font script="Beng" typeface="Vrinda"/>
-        <a:font script="Gujr" typeface="Shruti"/>
-        <a:font script="Khmr" typeface="MoolBoran"/>
-        <a:font script="Knda" typeface="Tunga"/>
-        <a:font script="Guru" typeface="Raavi"/>
-        <a:font script="Cans" typeface="Euphemia"/>
-        <a:font script="Cher" typeface="Plantagenet Cherokee"/>
-        <a:font script="Yiii" typeface="Microsoft Yi Baiti"/>
-        <a:font script="Tibt" typeface="Microsoft Himalaya"/>
-        <a:font script="Thaa" typeface="MV Boli"/>
-        <a:font script="Deva" typeface="Mangal"/>
-        <a:font script="Telu" typeface="Gautami"/>
-        <a:font script="Taml" typeface="Latha"/>
-        <a:font script="Syrc" typeface="Estrangelo Edessa"/>
-        <a:font script="Orya" typeface="Kalinga"/>
-        <a:font script="Mlym" typeface="Kartika"/>
-        <a:font script="Laoo" typeface="DokChampa"/>
-        <a:font script="Sinh" typeface="Iskoola Pota"/>
-        <a:font script="Mong" typeface="Mongolian Baiti"/>
-        <a:font script="Viet" typeface="Times New Roman"/>
-        <a:font script="Uigh" typeface="Microsoft Uighur"/>
-        <a:font script="Geor" typeface="Sylfaen"/>
-      </a:majorFont>
-      <a:minorFont>
-        <a:latin typeface="Arial"/>
-        <a:ea typeface=""/>
-        <a:cs typeface=""/>
-        <a:font script="Jpan" typeface="ＭＳ Ｐゴシック"/>
-        <a:font script="Hang" typeface="맑은 고딕"/>
-        <a:font script="Hans" typeface="宋体"/>
-        <a:font script="Hant" typeface="新細明體"/>
-        <a:font script="Arab" typeface="Arial"/>
-        <a:font script="Hebr" typeface="Arial"/>
-        <a:font script="Thai" typeface="Cordia New"/>
-        <a:font script="Ethi" typeface="Nyala"/>
-        <a:font script="Beng" typeface="Vrinda"/>
-        <a:font script="Gujr" typeface="Shruti"/>
-        <a:font script="Khmr" typeface="DaunPenh"/>
-        <a:font script="Knda" typeface="Tunga"/>
-        <a:font script="Guru" typeface="Raavi"/>
-        <a:font script="Cans" typeface="Euphemia"/>
-        <a:font script="Cher" typeface="Plantagenet Cherokee"/>
-        <a:font script="Yiii" typeface="Microsoft Yi Baiti"/>
-        <a:font script="Tibt" typeface="Microsoft Himalaya"/>
-        <a:font script="Thaa" typeface="MV Boli"/>
-        <a:font script="Deva" typeface="Mangal"/>
-        <a:font script="Telu" typeface="Gautami"/>
-        <a:font script="Taml" typeface="Latha"/>
-        <a:font script="Syrc" typeface="Estrangelo Edessa"/>
-        <a:font script="Orya" typeface="Kalinga"/>
-        <a:font script="Mlym" typeface="Kartika"/>
-        <a:font script="Laoo" typeface="DokChampa"/>
-        <a:font script="Sinh" typeface="Iskoola Pota"/>
-        <a:font script="Mong" typeface="Mongolian Baiti"/>
-        <a:font script="Viet" typeface="Arial"/>
-        <a:font script="Uigh" typeface="Microsoft Uighur"/>
-        <a:font script="Geor" typeface="Sylfaen"/>
-      </a:minorFont>
-    </a:fontScheme>
-    <a:fmtScheme name="Office">
-      <a:fillStyleLst>
-        <a:solidFill>
-          <a:schemeClr val="phClr"/>
-        </a:solidFill>
-        <a:gradFill rotWithShape="1">
-          <a:gsLst>
-            <a:gs pos="0">
-              <a:schemeClr val="phClr">
-                <a:tint val="50000"/>
-                <a:satMod val="300000"/>
-              </a:schemeClr>
-            </a:gs>
-            <a:gs pos="35000">
-              <a:schemeClr val="phClr">
-                <a:tint val="37000"/>
-                <a:satMod val="300000"/>
-              </a:schemeClr>
-            </a:gs>
-            <a:gs pos="100000">
-              <a:schemeClr val="phClr">
-                <a:tint val="15000"/>
-                <a:satMod val="350000"/>
-              </a:schemeClr>
-            </a:gs>
-          </a:gsLst>
-          <a:lin ang="16200000" scaled="1"/>
-        </a:gradFill>
-        <a:gradFill rotWithShape="1">
-          <a:gsLst>
-            <a:gs pos="0">
-              <a:schemeClr val="phClr">
-                <a:tint val="100000"/>
-                <a:shade val="100000"/>
-                <a:satMod val="130000"/>
-              </a:schemeClr>
-            </a:gs>
-            <a:gs pos="100000">
-              <a:schemeClr val="phClr">
-                <a:tint val="50000"/>
-                <a:shade val="100000"/>
-                <a:satMod val="350000"/>
-              </a:schemeClr>
-            </a:gs>
-          </a:gsLst>
-          <a:lin ang="16200000" scaled="0"/>
-        </a:gradFill>
-      </a:fillStyleLst>
-      <a:lnStyleLst>
-        <a:ln w="9525" cap="flat" cmpd="sng" algn="ctr">
-          <a:solidFill>
-            <a:schemeClr val="phClr">
-              <a:shade val="95000"/>
-              <a:satMod val="105000"/>
-            </a:schemeClr>
-          </a:solidFill>
-          <a:prstDash val="solid"/>
-        </a:ln>
-        <a:ln w="25400" cap="flat" cmpd="sng" algn="ctr">
-          <a:solidFill>
-            <a:schemeClr val="phClr"/>
-          </a:solidFill>
-          <a:prstDash val="solid"/>
-        </a:ln>
-        <a:ln w="38100" cap="flat" cmpd="sng" algn="ctr">
-          <a:solidFill>
-            <a:schemeClr val="phClr"/>
-          </a:solidFill>
-          <a:prstDash val="solid"/>
-        </a:ln>
-      </a:lnStyleLst>
-      <a:effectStyleLst>
-        <a:effectStyle>
-          <a:effectLst>
-            <a:outerShdw blurRad="40000" dist="20000" dir="5400000" rotWithShape="0">
-              <a:srgbClr val="000000">
-                <a:alpha val="38000"/>
-              </a:srgbClr>
-            </a:outerShdw>
-          </a:effectLst>
-        </a:effectStyle>
-        <a:effectStyle>
-          <a:effectLst>
-            <a:outerShdw blurRad="40000" dist="23000" dir="5400000" rotWithShape="0">
-              <a:srgbClr val="000000">
-                <a:alpha val="35000"/>
-              </a:srgbClr>
-            </a:outerShdw>
-          </a:effectLst>
-        </a:effectStyle>
-        <a:effectStyle>
-          <a:effectLst>
-            <a:outerShdw blurRad="40000" dist="23000" dir="5400000" rotWithShape="0">
-              <a:srgbClr val="000000">
-                <a:alpha val="35000"/>
-              </a:srgbClr>
-            </a:outerShdw>
-          </a:effectLst>
-          <a:scene3d>
-            <a:camera prst="orthographicFront">
-              <a:rot lat="0" lon="0" rev="0"/>
-            </a:camera>
-            <a:lightRig rig="threePt" dir="t">
-              <a:rot lat="0" lon="0" rev="1200000"/>
-            </a:lightRig>
-          </a:scene3d>
-          <a:sp3d>
-            <a:bevelT w="63500" h="25400"/>
-          </a:sp3d>
-        </a:effectStyle>
-      </a:effectStyleLst>
-      <a:bgFillStyleLst>
-        <a:solidFill>
-          <a:schemeClr val="phClr"/>
-        </a:solidFill>
-        <a:gradFill rotWithShape="1">
-          <a:gsLst>
-            <a:gs pos="0">
-              <a:schemeClr val="phClr">
-                <a:tint val="40000"/>
-                <a:satMod val="350000"/>
-              </a:schemeClr>
-            </a:gs>
-            <a:gs pos="40000">
-              <a:schemeClr val="phClr">
-                <a:tint val="45000"/>
-                <a:shade val="99000"/>
-                <a:satMod val="350000"/>
-              </a:schemeClr>
-            </a:gs>
-            <a:gs pos="100000">
-              <a:schemeClr val="phClr">
-                <a:shade val="20000"/>
-                <a:satMod val="255000"/>
-              </a:schemeClr>
-            </a:gs>
-          </a:gsLst>
-          <a:path path="circle">
-            <a:fillToRect l="50000" t="-80000" r="50000" b="180000"/>
-          </a:path>
-        </a:gradFill>
-        <a:gradFill rotWithShape="1">
-          <a:gsLst>
-            <a:gs pos="0">
-              <a:schemeClr val="phClr">
-                <a:tint val="80000"/>
-                <a:satMod val="300000"/>
-              </a:schemeClr>
-            </a:gs>
-            <a:gs pos="100000">
-              <a:schemeClr val="phClr">
-                <a:shade val="30000"/>
-                <a:satMod val="200000"/>
-              </a:schemeClr>
-            </a:gs>
-          </a:gsLst>
-          <a:path path="circle">
-            <a:fillToRect l="50000" t="50000" r="50000" b="50000"/>
-          </a:path>
-        </a:gradFill>
-      </a:bgFillStyleLst>
-    </a:fmtScheme>
-  </a:themeElements>
-</a:theme>
 </file>
</xml_diff>